<commit_message>
slide deck mostly complete
</commit_message>
<xml_diff>
--- a/ppt/debugging-in-python.pptx
+++ b/ppt/debugging-in-python.pptx
@@ -5,10 +5,10 @@
     <p:sldMasterId id="2147483648" r:id="rId1"/>
   </p:sldMasterIdLst>
   <p:notesMasterIdLst>
-    <p:notesMasterId r:id="rId15"/>
+    <p:notesMasterId r:id="rId14"/>
   </p:notesMasterIdLst>
   <p:handoutMasterIdLst>
-    <p:handoutMasterId r:id="rId16"/>
+    <p:handoutMasterId r:id="rId15"/>
   </p:handoutMasterIdLst>
   <p:sldIdLst>
     <p:sldId id="295" r:id="rId2"/>
@@ -16,14 +16,13 @@
     <p:sldId id="297" r:id="rId4"/>
     <p:sldId id="304" r:id="rId5"/>
     <p:sldId id="306" r:id="rId6"/>
-    <p:sldId id="307" r:id="rId7"/>
-    <p:sldId id="303" r:id="rId8"/>
-    <p:sldId id="302" r:id="rId9"/>
-    <p:sldId id="305" r:id="rId10"/>
-    <p:sldId id="298" r:id="rId11"/>
-    <p:sldId id="299" r:id="rId12"/>
-    <p:sldId id="300" r:id="rId13"/>
-    <p:sldId id="296" r:id="rId14"/>
+    <p:sldId id="308" r:id="rId7"/>
+    <p:sldId id="307" r:id="rId8"/>
+    <p:sldId id="309" r:id="rId9"/>
+    <p:sldId id="298" r:id="rId10"/>
+    <p:sldId id="299" r:id="rId11"/>
+    <p:sldId id="300" r:id="rId12"/>
+    <p:sldId id="296" r:id="rId13"/>
   </p:sldIdLst>
   <p:sldSz cx="12192000" cy="6858000"/>
   <p:notesSz cx="6858000" cy="9144000"/>
@@ -10765,164 +10764,6 @@
       </p:grpSpPr>
       <p:sp>
         <p:nvSpPr>
-          <p:cNvPr id="6" name="Title 5">
-            <a:extLst>
-              <a:ext uri="{FF2B5EF4-FFF2-40B4-BE49-F238E27FC236}">
-                <a16:creationId xmlns:a16="http://schemas.microsoft.com/office/drawing/2014/main" id="{799A42EC-49B8-97EB-A246-0D49734CC4E0}"/>
-              </a:ext>
-            </a:extLst>
-          </p:cNvPr>
-          <p:cNvSpPr>
-            <a:spLocks noGrp="1"/>
-          </p:cNvSpPr>
-          <p:nvPr>
-            <p:ph type="title"/>
-          </p:nvPr>
-        </p:nvSpPr>
-        <p:spPr/>
-        <p:txBody>
-          <a:bodyPr/>
-          <a:lstStyle/>
-          <a:p>
-            <a:r>
-              <a:rPr lang="en-US" dirty="0"/>
-              <a:t>Let’s get started!</a:t>
-            </a:r>
-          </a:p>
-        </p:txBody>
-      </p:sp>
-      <p:sp>
-        <p:nvSpPr>
-          <p:cNvPr id="7" name="Text Placeholder 6">
-            <a:extLst>
-              <a:ext uri="{FF2B5EF4-FFF2-40B4-BE49-F238E27FC236}">
-                <a16:creationId xmlns:a16="http://schemas.microsoft.com/office/drawing/2014/main" id="{BA3285D9-E615-694B-CE77-B327E021E682}"/>
-              </a:ext>
-            </a:extLst>
-          </p:cNvPr>
-          <p:cNvSpPr>
-            <a:spLocks noGrp="1"/>
-          </p:cNvSpPr>
-          <p:nvPr>
-            <p:ph type="body" sz="quarter" idx="10"/>
-          </p:nvPr>
-        </p:nvSpPr>
-        <p:spPr/>
-        <p:txBody>
-          <a:bodyPr/>
-          <a:lstStyle/>
-          <a:p>
-            <a:r>
-              <a:rPr lang="en-US" dirty="0"/>
-              <a:t>Hands-on</a:t>
-            </a:r>
-          </a:p>
-        </p:txBody>
-      </p:sp>
-      <p:sp>
-        <p:nvSpPr>
-          <p:cNvPr id="4" name="Footer Placeholder 3">
-            <a:extLst>
-              <a:ext uri="{FF2B5EF4-FFF2-40B4-BE49-F238E27FC236}">
-                <a16:creationId xmlns:a16="http://schemas.microsoft.com/office/drawing/2014/main" id="{EA5BCBE5-A728-9E1E-1AA0-95A175A194CA}"/>
-              </a:ext>
-            </a:extLst>
-          </p:cNvPr>
-          <p:cNvSpPr>
-            <a:spLocks noGrp="1"/>
-          </p:cNvSpPr>
-          <p:nvPr>
-            <p:ph type="ftr" sz="quarter" idx="11"/>
-          </p:nvPr>
-        </p:nvSpPr>
-        <p:spPr/>
-        <p:txBody>
-          <a:bodyPr/>
-          <a:lstStyle/>
-          <a:p>
-            <a:pPr algn="ctr"/>
-            <a:r>
-              <a:rPr lang="en-AU"/>
-              <a:t>Debugging Superpowers in Python</a:t>
-            </a:r>
-            <a:endParaRPr lang="en-AU" dirty="0"/>
-          </a:p>
-        </p:txBody>
-      </p:sp>
-      <p:sp>
-        <p:nvSpPr>
-          <p:cNvPr id="5" name="Slide Number Placeholder 4">
-            <a:extLst>
-              <a:ext uri="{FF2B5EF4-FFF2-40B4-BE49-F238E27FC236}">
-                <a16:creationId xmlns:a16="http://schemas.microsoft.com/office/drawing/2014/main" id="{1E925C1A-D32C-166C-A2C7-CBEB339D5AE0}"/>
-              </a:ext>
-            </a:extLst>
-          </p:cNvPr>
-          <p:cNvSpPr>
-            <a:spLocks noGrp="1"/>
-          </p:cNvSpPr>
-          <p:nvPr>
-            <p:ph type="sldNum" sz="quarter" idx="12"/>
-          </p:nvPr>
-        </p:nvSpPr>
-        <p:spPr/>
-        <p:txBody>
-          <a:bodyPr/>
-          <a:lstStyle/>
-          <a:p>
-            <a:fld id="{E917DE0E-AFB1-41FD-BC35-27DB61CA125F}" type="slidenum">
-              <a:rPr lang="en-AU" smtClean="0"/>
-              <a:pPr/>
-              <a:t>10</a:t>
-            </a:fld>
-            <a:endParaRPr lang="en-AU" dirty="0"/>
-          </a:p>
-        </p:txBody>
-      </p:sp>
-    </p:spTree>
-    <p:extLst>
-      <p:ext uri="{BB962C8B-B14F-4D97-AF65-F5344CB8AC3E}">
-        <p14:creationId xmlns:p14="http://schemas.microsoft.com/office/powerpoint/2010/main" val="1617233645"/>
-      </p:ext>
-    </p:extLst>
-  </p:cSld>
-  <p:clrMapOvr>
-    <a:masterClrMapping/>
-  </p:clrMapOvr>
-  <mc:AlternateContent xmlns:mc="http://schemas.openxmlformats.org/markup-compatibility/2006" xmlns:p14="http://schemas.microsoft.com/office/powerpoint/2010/main">
-    <mc:Choice Requires="p14">
-      <p:transition spd="med" p14:dur="700">
-        <p:fade/>
-      </p:transition>
-    </mc:Choice>
-    <mc:Fallback xmlns="">
-      <p:transition spd="med">
-        <p:fade/>
-      </p:transition>
-    </mc:Fallback>
-  </mc:AlternateContent>
-</p:sld>
-</file>
-
-<file path=ppt/slides/slide11.xml><?xml version="1.0" encoding="utf-8"?>
-<p:sld xmlns:a="http://schemas.openxmlformats.org/drawingml/2006/main" xmlns:r="http://schemas.openxmlformats.org/officeDocument/2006/relationships" xmlns:p="http://schemas.openxmlformats.org/presentationml/2006/main">
-  <p:cSld>
-    <p:spTree>
-      <p:nvGrpSpPr>
-        <p:cNvPr id="1" name=""/>
-        <p:cNvGrpSpPr/>
-        <p:nvPr/>
-      </p:nvGrpSpPr>
-      <p:grpSpPr>
-        <a:xfrm>
-          <a:off x="0" y="0"/>
-          <a:ext cx="0" cy="0"/>
-          <a:chOff x="0" y="0"/>
-          <a:chExt cx="0" cy="0"/>
-        </a:xfrm>
-      </p:grpSpPr>
-      <p:sp>
-        <p:nvSpPr>
           <p:cNvPr id="7" name="Content Placeholder 6">
             <a:extLst>
               <a:ext uri="{FF2B5EF4-FFF2-40B4-BE49-F238E27FC236}">
@@ -10951,35 +10792,38 @@
             </a:pPr>
             <a:r>
               <a:rPr lang="en-US" dirty="0"/>
-              <a:t>Tests are great!</a:t>
-            </a:r>
-          </a:p>
-          <a:p>
-            <a:pPr marL="466725" indent="-457200">
-              <a:buSzPct val="110000"/>
-              <a:buBlip>
-                <a:blip r:embed="rId2"/>
-              </a:buBlip>
-            </a:pPr>
-            <a:r>
-              <a:rPr lang="en-US" dirty="0" err="1"/>
-              <a:t>PyTest</a:t>
-            </a:r>
-            <a:r>
-              <a:rPr lang="en-US" dirty="0"/>
-              <a:t> lets you automate and scale testing in an unintrusive way</a:t>
+              <a:t>The debugger is awesome!</a:t>
             </a:r>
           </a:p>
           <a:p>
             <a:pPr marL="466725" indent="-457200">
               <a:buSzPct val="80000"/>
               <a:buFont typeface="System Font Regular"/>
-              <a:buChar char="🪴"/>
+              <a:buChar char="🎉"/>
             </a:pPr>
             <a:r>
               <a:rPr lang="en-US" dirty="0"/>
-              <a:t>Test-Driven Development is a useful paradigm to thoughtfully grow your codebase</a:t>
-            </a:r>
+              <a:t>VS Code’s implementation of the debugger is very helpful!</a:t>
+            </a:r>
+          </a:p>
+          <a:p>
+            <a:pPr marL="466725" indent="-457200">
+              <a:buSzPct val="80000"/>
+              <a:buFont typeface="System Font Regular"/>
+              <a:buChar char="🎉"/>
+            </a:pPr>
+            <a:r>
+              <a:rPr lang="en-US" dirty="0"/>
+              <a:t>You can have full control over your code’s execution</a:t>
+            </a:r>
+          </a:p>
+          <a:p>
+            <a:pPr marL="466725" indent="-457200">
+              <a:buSzPct val="80000"/>
+              <a:buFont typeface="System Font Regular"/>
+              <a:buChar char="🎉"/>
+            </a:pPr>
+            <a:endParaRPr lang="en-US" dirty="0"/>
           </a:p>
         </p:txBody>
       </p:sp>
@@ -11065,7 +10909,7 @@
             <a:fld id="{E917DE0E-AFB1-41FD-BC35-27DB61CA125F}" type="slidenum">
               <a:rPr lang="en-AU" smtClean="0"/>
               <a:pPr/>
-              <a:t>11</a:t>
+              <a:t>10</a:t>
             </a:fld>
             <a:endParaRPr lang="en-AU" dirty="0"/>
           </a:p>
@@ -11312,7 +11156,7 @@
 </p:sld>
 </file>
 
-<file path=ppt/slides/slide12.xml><?xml version="1.0" encoding="utf-8"?>
+<file path=ppt/slides/slide11.xml><?xml version="1.0" encoding="utf-8"?>
 <p:sld xmlns:a="http://schemas.openxmlformats.org/drawingml/2006/main" xmlns:r="http://schemas.openxmlformats.org/officeDocument/2006/relationships" xmlns:p="http://schemas.openxmlformats.org/presentationml/2006/main">
   <p:cSld>
     <p:spTree>
@@ -11350,41 +11194,11 @@
           <a:bodyPr/>
           <a:lstStyle/>
           <a:p>
-            <a:pPr marL="401638" indent="-392113">
+            <a:pPr marL="9525" indent="0">
               <a:buSzPct val="120000"/>
-              <a:buBlip>
-                <a:blip r:embed="rId2"/>
-              </a:buBlip>
+              <a:buNone/>
             </a:pPr>
-            <a:r>
-              <a:rPr lang="en-US" dirty="0">
-                <a:hlinkClick r:id="rId3"/>
-              </a:rPr>
-              <a:t>Explore the PyTest documentation</a:t>
-            </a:r>
             <a:endParaRPr lang="en-US" dirty="0"/>
-          </a:p>
-          <a:p>
-            <a:pPr marL="401638" indent="-401638">
-              <a:buBlip>
-                <a:blip r:embed="rId4"/>
-              </a:buBlip>
-            </a:pPr>
-            <a:r>
-              <a:rPr lang="en-US" dirty="0"/>
-              <a:t>Automate testing with GitHub Actions</a:t>
-            </a:r>
-          </a:p>
-          <a:p>
-            <a:pPr marL="401638" indent="-392113">
-              <a:buSzPct val="80000"/>
-              <a:buFont typeface="System Font Regular"/>
-              <a:buChar char="🤔"/>
-            </a:pPr>
-            <a:r>
-              <a:rPr lang="en-US" dirty="0"/>
-              <a:t>Learn about Mocking</a:t>
-            </a:r>
           </a:p>
           <a:p>
             <a:pPr marL="401638" indent="-392113">
@@ -11394,8 +11208,66 @@
             </a:pPr>
             <a:r>
               <a:rPr lang="en-US" dirty="0"/>
-              <a:t>Actually write (any kind of) tests!</a:t>
-            </a:r>
+              <a:t>Debug, debug, debug!</a:t>
+            </a:r>
+          </a:p>
+          <a:p>
+            <a:pPr marL="401638" indent="-392113">
+              <a:buSzPct val="80000"/>
+              <a:buFont typeface="System Font Regular"/>
+              <a:buChar char="😎"/>
+            </a:pPr>
+            <a:r>
+              <a:rPr lang="en-US" dirty="0"/>
+              <a:t>Debug someone else’s code!</a:t>
+            </a:r>
+          </a:p>
+          <a:p>
+            <a:pPr marL="858838" lvl="1" indent="-392113">
+              <a:buSzPct val="80000"/>
+              <a:buFont typeface="System Font Regular"/>
+              <a:buChar char="😎"/>
+            </a:pPr>
+            <a:r>
+              <a:rPr lang="en-US" dirty="0"/>
+              <a:t>Note: You may want to set </a:t>
+            </a:r>
+            <a:r>
+              <a:rPr lang="en-US" dirty="0">
+                <a:hlinkClick r:id="rId2"/>
+              </a:rPr>
+              <a:t>“justmycode” to false in your launch.json</a:t>
+            </a:r>
+            <a:endParaRPr lang="en-US" dirty="0"/>
+          </a:p>
+          <a:p>
+            <a:pPr marL="401638" indent="-392113">
+              <a:buSzPct val="80000"/>
+              <a:buFont typeface="System Font Regular"/>
+              <a:buChar char="😎"/>
+            </a:pPr>
+            <a:r>
+              <a:rPr lang="en-US" dirty="0"/>
+              <a:t>Learn to debug performance issues with profiling!</a:t>
+            </a:r>
+          </a:p>
+          <a:p>
+            <a:pPr marL="401638" indent="-392113">
+              <a:buSzPct val="80000"/>
+              <a:buFont typeface="System Font Regular"/>
+              <a:buChar char="😎"/>
+            </a:pPr>
+            <a:r>
+              <a:rPr lang="en-US" dirty="0"/>
+              <a:t>Learn to debug parallel programs!</a:t>
+            </a:r>
+          </a:p>
+          <a:p>
+            <a:pPr marL="9525" indent="0">
+              <a:buSzPct val="80000"/>
+              <a:buNone/>
+            </a:pPr>
+            <a:endParaRPr lang="en-US" dirty="0"/>
           </a:p>
         </p:txBody>
       </p:sp>
@@ -11480,7 +11352,7 @@
             <a:fld id="{E917DE0E-AFB1-41FD-BC35-27DB61CA125F}" type="slidenum">
               <a:rPr lang="en-AU" smtClean="0"/>
               <a:pPr/>
-              <a:t>12</a:t>
+              <a:t>11</a:t>
             </a:fld>
             <a:endParaRPr lang="en-AU" dirty="0"/>
           </a:p>
@@ -11544,7 +11416,7 @@
                                         <p:tgtEl>
                                           <p:spTgt spid="2">
                                             <p:txEl>
-                                              <p:pRg st="0" end="0"/>
+                                              <p:pRg st="1" end="1"/>
                                             </p:txEl>
                                           </p:spTgt>
                                         </p:tgtEl>
@@ -11562,7 +11434,7 @@
                                         <p:tgtEl>
                                           <p:spTgt spid="2">
                                             <p:txEl>
-                                              <p:pRg st="0" end="0"/>
+                                              <p:pRg st="1" end="1"/>
                                             </p:txEl>
                                           </p:spTgt>
                                         </p:tgtEl>
@@ -11605,7 +11477,7 @@
                                         <p:tgtEl>
                                           <p:spTgt spid="2">
                                             <p:txEl>
-                                              <p:pRg st="1" end="1"/>
+                                              <p:pRg st="2" end="2"/>
                                             </p:txEl>
                                           </p:spTgt>
                                         </p:tgtEl>
@@ -11623,67 +11495,6 @@
                                         <p:tgtEl>
                                           <p:spTgt spid="2">
                                             <p:txEl>
-                                              <p:pRg st="1" end="1"/>
-                                            </p:txEl>
-                                          </p:spTgt>
-                                        </p:tgtEl>
-                                      </p:cBhvr>
-                                    </p:animEffect>
-                                  </p:childTnLst>
-                                </p:cTn>
-                              </p:par>
-                            </p:childTnLst>
-                          </p:cTn>
-                        </p:par>
-                      </p:childTnLst>
-                    </p:cTn>
-                  </p:par>
-                  <p:par>
-                    <p:cTn id="13" fill="hold">
-                      <p:stCondLst>
-                        <p:cond delay="indefinite"/>
-                      </p:stCondLst>
-                      <p:childTnLst>
-                        <p:par>
-                          <p:cTn id="14" fill="hold">
-                            <p:stCondLst>
-                              <p:cond delay="0"/>
-                            </p:stCondLst>
-                            <p:childTnLst>
-                              <p:par>
-                                <p:cTn id="15" presetID="10" presetClass="entr" presetSubtype="0" fill="hold" grpId="0" nodeType="clickEffect">
-                                  <p:stCondLst>
-                                    <p:cond delay="0"/>
-                                  </p:stCondLst>
-                                  <p:childTnLst>
-                                    <p:set>
-                                      <p:cBhvr>
-                                        <p:cTn id="16" dur="1" fill="hold">
-                                          <p:stCondLst>
-                                            <p:cond delay="0"/>
-                                          </p:stCondLst>
-                                        </p:cTn>
-                                        <p:tgtEl>
-                                          <p:spTgt spid="2">
-                                            <p:txEl>
-                                              <p:pRg st="2" end="2"/>
-                                            </p:txEl>
-                                          </p:spTgt>
-                                        </p:tgtEl>
-                                        <p:attrNameLst>
-                                          <p:attrName>style.visibility</p:attrName>
-                                        </p:attrNameLst>
-                                      </p:cBhvr>
-                                      <p:to>
-                                        <p:strVal val="visible"/>
-                                      </p:to>
-                                    </p:set>
-                                    <p:animEffect transition="in" filter="fade">
-                                      <p:cBhvr>
-                                        <p:cTn id="17" dur="500"/>
-                                        <p:tgtEl>
-                                          <p:spTgt spid="2">
-                                            <p:txEl>
                                               <p:pRg st="2" end="2"/>
                                             </p:txEl>
                                           </p:spTgt>
@@ -11693,33 +11504,15 @@
                                   </p:childTnLst>
                                 </p:cTn>
                               </p:par>
-                            </p:childTnLst>
-                          </p:cTn>
-                        </p:par>
-                      </p:childTnLst>
-                    </p:cTn>
-                  </p:par>
-                  <p:par>
-                    <p:cTn id="18" fill="hold">
-                      <p:stCondLst>
-                        <p:cond delay="indefinite"/>
-                      </p:stCondLst>
-                      <p:childTnLst>
-                        <p:par>
-                          <p:cTn id="19" fill="hold">
-                            <p:stCondLst>
-                              <p:cond delay="0"/>
-                            </p:stCondLst>
-                            <p:childTnLst>
                               <p:par>
-                                <p:cTn id="20" presetID="10" presetClass="entr" presetSubtype="0" fill="hold" grpId="0" nodeType="clickEffect">
+                                <p:cTn id="13" presetID="10" presetClass="entr" presetSubtype="0" fill="hold" grpId="0" nodeType="withEffect">
                                   <p:stCondLst>
                                     <p:cond delay="0"/>
                                   </p:stCondLst>
                                   <p:childTnLst>
                                     <p:set>
                                       <p:cBhvr>
-                                        <p:cTn id="21" dur="1" fill="hold">
+                                        <p:cTn id="14" dur="1" fill="hold">
                                           <p:stCondLst>
                                             <p:cond delay="0"/>
                                           </p:stCondLst>
@@ -11741,11 +11534,133 @@
                                     </p:set>
                                     <p:animEffect transition="in" filter="fade">
                                       <p:cBhvr>
-                                        <p:cTn id="22" dur="500"/>
+                                        <p:cTn id="15" dur="500"/>
                                         <p:tgtEl>
                                           <p:spTgt spid="2">
                                             <p:txEl>
                                               <p:pRg st="3" end="3"/>
+                                            </p:txEl>
+                                          </p:spTgt>
+                                        </p:tgtEl>
+                                      </p:cBhvr>
+                                    </p:animEffect>
+                                  </p:childTnLst>
+                                </p:cTn>
+                              </p:par>
+                            </p:childTnLst>
+                          </p:cTn>
+                        </p:par>
+                      </p:childTnLst>
+                    </p:cTn>
+                  </p:par>
+                  <p:par>
+                    <p:cTn id="16" fill="hold">
+                      <p:stCondLst>
+                        <p:cond delay="indefinite"/>
+                      </p:stCondLst>
+                      <p:childTnLst>
+                        <p:par>
+                          <p:cTn id="17" fill="hold">
+                            <p:stCondLst>
+                              <p:cond delay="0"/>
+                            </p:stCondLst>
+                            <p:childTnLst>
+                              <p:par>
+                                <p:cTn id="18" presetID="10" presetClass="entr" presetSubtype="0" fill="hold" grpId="0" nodeType="clickEffect">
+                                  <p:stCondLst>
+                                    <p:cond delay="0"/>
+                                  </p:stCondLst>
+                                  <p:childTnLst>
+                                    <p:set>
+                                      <p:cBhvr>
+                                        <p:cTn id="19" dur="1" fill="hold">
+                                          <p:stCondLst>
+                                            <p:cond delay="0"/>
+                                          </p:stCondLst>
+                                        </p:cTn>
+                                        <p:tgtEl>
+                                          <p:spTgt spid="2">
+                                            <p:txEl>
+                                              <p:pRg st="4" end="4"/>
+                                            </p:txEl>
+                                          </p:spTgt>
+                                        </p:tgtEl>
+                                        <p:attrNameLst>
+                                          <p:attrName>style.visibility</p:attrName>
+                                        </p:attrNameLst>
+                                      </p:cBhvr>
+                                      <p:to>
+                                        <p:strVal val="visible"/>
+                                      </p:to>
+                                    </p:set>
+                                    <p:animEffect transition="in" filter="fade">
+                                      <p:cBhvr>
+                                        <p:cTn id="20" dur="500"/>
+                                        <p:tgtEl>
+                                          <p:spTgt spid="2">
+                                            <p:txEl>
+                                              <p:pRg st="4" end="4"/>
+                                            </p:txEl>
+                                          </p:spTgt>
+                                        </p:tgtEl>
+                                      </p:cBhvr>
+                                    </p:animEffect>
+                                  </p:childTnLst>
+                                </p:cTn>
+                              </p:par>
+                            </p:childTnLst>
+                          </p:cTn>
+                        </p:par>
+                      </p:childTnLst>
+                    </p:cTn>
+                  </p:par>
+                  <p:par>
+                    <p:cTn id="21" fill="hold">
+                      <p:stCondLst>
+                        <p:cond delay="indefinite"/>
+                      </p:stCondLst>
+                      <p:childTnLst>
+                        <p:par>
+                          <p:cTn id="22" fill="hold">
+                            <p:stCondLst>
+                              <p:cond delay="0"/>
+                            </p:stCondLst>
+                            <p:childTnLst>
+                              <p:par>
+                                <p:cTn id="23" presetID="10" presetClass="entr" presetSubtype="0" fill="hold" grpId="0" nodeType="clickEffect">
+                                  <p:stCondLst>
+                                    <p:cond delay="0"/>
+                                  </p:stCondLst>
+                                  <p:childTnLst>
+                                    <p:set>
+                                      <p:cBhvr>
+                                        <p:cTn id="24" dur="1" fill="hold">
+                                          <p:stCondLst>
+                                            <p:cond delay="0"/>
+                                          </p:stCondLst>
+                                        </p:cTn>
+                                        <p:tgtEl>
+                                          <p:spTgt spid="2">
+                                            <p:txEl>
+                                              <p:pRg st="5" end="5"/>
+                                            </p:txEl>
+                                          </p:spTgt>
+                                        </p:tgtEl>
+                                        <p:attrNameLst>
+                                          <p:attrName>style.visibility</p:attrName>
+                                        </p:attrNameLst>
+                                      </p:cBhvr>
+                                      <p:to>
+                                        <p:strVal val="visible"/>
+                                      </p:to>
+                                    </p:set>
+                                    <p:animEffect transition="in" filter="fade">
+                                      <p:cBhvr>
+                                        <p:cTn id="25" dur="500"/>
+                                        <p:tgtEl>
+                                          <p:spTgt spid="2">
+                                            <p:txEl>
+                                              <p:pRg st="5" end="5"/>
                                             </p:txEl>
                                           </p:spTgt>
                                         </p:tgtEl>
@@ -11788,7 +11703,7 @@
 </p:sld>
 </file>
 
-<file path=ppt/slides/slide13.xml><?xml version="1.0" encoding="utf-8"?>
+<file path=ppt/slides/slide12.xml><?xml version="1.0" encoding="utf-8"?>
 <p:sld xmlns:a="http://schemas.openxmlformats.org/drawingml/2006/main" xmlns:r="http://schemas.openxmlformats.org/officeDocument/2006/relationships" xmlns:p="http://schemas.openxmlformats.org/presentationml/2006/main">
   <p:cSld>
     <p:spTree>
@@ -11887,7 +11802,7 @@
             <a:fld id="{E917DE0E-AFB1-41FD-BC35-27DB61CA125F}" type="slidenum">
               <a:rPr lang="en-AU" smtClean="0"/>
               <a:pPr/>
-              <a:t>13</a:t>
+              <a:t>12</a:t>
             </a:fld>
             <a:endParaRPr lang="en-AU" dirty="0"/>
           </a:p>
@@ -11938,23 +11853,8 @@
                 </a:solidFill>
                 <a:latin typeface="National 2" panose="020B0504030502020203" pitchFamily="34" charset="77"/>
               </a:rPr>
-              <a:t>/intro-to-</a:t>
-            </a:r>
-            <a:r>
-              <a:rPr lang="en-AU" dirty="0" err="1">
-                <a:solidFill>
-                  <a:schemeClr val="bg1"/>
-                </a:solidFill>
-                <a:latin typeface="National 2" panose="020B0504030502020203" pitchFamily="34" charset="77"/>
-              </a:rPr>
-              <a:t>pytest</a:t>
-            </a:r>
-            <a:endParaRPr lang="en-AU" dirty="0">
-              <a:solidFill>
-                <a:schemeClr val="bg1"/>
-              </a:solidFill>
-              <a:latin typeface="National 2" panose="020B0504030502020203" pitchFamily="34" charset="77"/>
-            </a:endParaRPr>
+              <a:t>/debugging-in-python</a:t>
+            </a:r>
           </a:p>
         </p:txBody>
       </p:sp>
@@ -12473,39 +12373,43 @@
           <a:bodyPr/>
           <a:lstStyle/>
           <a:p>
-            <a:pPr marL="411163" indent="-400050">
+            <a:pPr marL="468313" indent="-457200">
+              <a:buSzPct val="80000"/>
+              <a:buFont typeface="System Font Regular"/>
+              <a:buChar char="💥"/>
+            </a:pPr>
+            <a:r>
+              <a:rPr lang="en-US" dirty="0"/>
+              <a:t>Every programmer eventually hits an error in their program</a:t>
+            </a:r>
+          </a:p>
+          <a:p>
+            <a:pPr marL="868363" lvl="1" indent="-400050">
+              <a:buSzPct val="80000"/>
+              <a:buFont typeface="System Font Regular"/>
+              <a:buChar char="😵‍💫"/>
+            </a:pPr>
+            <a:r>
+              <a:rPr lang="en-US" dirty="0"/>
+              <a:t>Syntax errors, runtime errors, logic errors, …</a:t>
+            </a:r>
+          </a:p>
+          <a:p>
+            <a:pPr marL="468313" indent="-457200">
               <a:buSzPct val="80000"/>
               <a:buFont typeface="System Font Regular"/>
               <a:buChar char="🐛"/>
             </a:pPr>
             <a:r>
               <a:rPr lang="en-US" dirty="0"/>
-              <a:t>Every programmer eventually hits an error in their program</a:t>
-            </a:r>
-          </a:p>
-          <a:p>
-            <a:pPr marL="868363" lvl="1" indent="-400050">
-              <a:buSzPct val="80000"/>
+              <a:t>“Debugging” is the process of systematically identifying and removing these bugs</a:t>
+            </a:r>
+          </a:p>
+          <a:p>
+            <a:pPr>
               <a:buFont typeface="System Font Regular"/>
-              <a:buChar char="🐛"/>
+              <a:buChar char="💥"/>
             </a:pPr>
-            <a:r>
-              <a:rPr lang="en-US" dirty="0"/>
-              <a:t>Syntax errors, runtime errors, logic errors, …</a:t>
-            </a:r>
-          </a:p>
-          <a:p>
-            <a:pPr marL="411163" indent="-400050">
-              <a:buSzPct val="80000"/>
-              <a:buFont typeface="System Font Regular"/>
-              <a:buChar char="🐛"/>
-            </a:pPr>
-            <a:r>
-              <a:rPr lang="en-US" dirty="0"/>
-              <a:t>“Debugging” is the process of systematically identifying and removing these bugs</a:t>
-            </a:r>
-          </a:p>
-          <a:p>
             <a:endParaRPr lang="en-US" dirty="0"/>
           </a:p>
         </p:txBody>
@@ -12911,7 +12815,7 @@
                             </p:stCondLst>
                             <p:childTnLst>
                               <p:par>
-                                <p:cTn id="13" presetID="10" presetClass="entr" presetSubtype="0" fill="hold" grpId="0" nodeType="clickEffect">
+                                <p:cTn id="13" presetID="10" presetClass="entr" presetSubtype="0" fill="hold" nodeType="clickEffect">
                                   <p:stCondLst>
                                     <p:cond delay="0"/>
                                   </p:stCondLst>
@@ -12919,6 +12823,59 @@
                                     <p:set>
                                       <p:cBhvr>
                                         <p:cTn id="14" dur="1" fill="hold">
+                                          <p:stCondLst>
+                                            <p:cond delay="0"/>
+                                          </p:stCondLst>
+                                        </p:cTn>
+                                        <p:tgtEl>
+                                          <p:spTgt spid="10"/>
+                                        </p:tgtEl>
+                                        <p:attrNameLst>
+                                          <p:attrName>style.visibility</p:attrName>
+                                        </p:attrNameLst>
+                                      </p:cBhvr>
+                                      <p:to>
+                                        <p:strVal val="visible"/>
+                                      </p:to>
+                                    </p:set>
+                                    <p:animEffect transition="in" filter="fade">
+                                      <p:cBhvr>
+                                        <p:cTn id="15" dur="500"/>
+                                        <p:tgtEl>
+                                          <p:spTgt spid="10"/>
+                                        </p:tgtEl>
+                                      </p:cBhvr>
+                                    </p:animEffect>
+                                  </p:childTnLst>
+                                </p:cTn>
+                              </p:par>
+                            </p:childTnLst>
+                          </p:cTn>
+                        </p:par>
+                      </p:childTnLst>
+                    </p:cTn>
+                  </p:par>
+                  <p:par>
+                    <p:cTn id="16" fill="hold">
+                      <p:stCondLst>
+                        <p:cond delay="indefinite"/>
+                      </p:stCondLst>
+                      <p:childTnLst>
+                        <p:par>
+                          <p:cTn id="17" fill="hold">
+                            <p:stCondLst>
+                              <p:cond delay="0"/>
+                            </p:stCondLst>
+                            <p:childTnLst>
+                              <p:par>
+                                <p:cTn id="18" presetID="10" presetClass="entr" presetSubtype="0" fill="hold" grpId="0" nodeType="clickEffect">
+                                  <p:stCondLst>
+                                    <p:cond delay="0"/>
+                                  </p:stCondLst>
+                                  <p:childTnLst>
+                                    <p:set>
+                                      <p:cBhvr>
+                                        <p:cTn id="19" dur="1" fill="hold">
                                           <p:stCondLst>
                                             <p:cond delay="0"/>
                                           </p:stCondLst>
@@ -12940,7 +12897,7 @@
                                     </p:set>
                                     <p:animEffect transition="in" filter="fade">
                                       <p:cBhvr>
-                                        <p:cTn id="15" dur="500"/>
+                                        <p:cTn id="20" dur="500"/>
                                         <p:tgtEl>
                                           <p:spTgt spid="2">
                                             <p:txEl>
@@ -12981,7 +12938,7 @@
       </p:par>
     </p:tnLst>
     <p:bldLst>
-      <p:bldP spid="2" grpId="0" build="p"/>
+      <p:bldP spid="2" grpId="0" uiExpand="1" build="p"/>
     </p:bldLst>
   </p:timing>
 </p:sld>
@@ -13032,6 +12989,11 @@
           </a:bodyPr>
           <a:lstStyle/>
           <a:p>
+            <a:pPr marL="457200" indent="-457200">
+              <a:buSzPct val="80000"/>
+              <a:buFont typeface="System Font Regular"/>
+              <a:buChar char="🧠"/>
+            </a:pPr>
             <a:r>
               <a:rPr lang="en-US" dirty="0">
                 <a:latin typeface="National 2" panose="020B0504030502020203" pitchFamily="34" charset="77"/>
@@ -13042,6 +13004,11 @@
             </a:r>
           </a:p>
           <a:p>
+            <a:pPr marL="457200" indent="-457200">
+              <a:buSzPct val="80000"/>
+              <a:buFont typeface="System Font Regular"/>
+              <a:buChar char="😵‍💫"/>
+            </a:pPr>
             <a:r>
               <a:rPr lang="en-US" dirty="0">
                 <a:latin typeface="Menlo" panose="020B0609030804020204" pitchFamily="49" charset="0"/>
@@ -13056,15 +13023,30 @@
             </a:r>
           </a:p>
           <a:p>
+            <a:pPr marL="457200" indent="-457200">
+              <a:buSzPct val="80000"/>
+              <a:buFont typeface="System Font Regular"/>
+              <a:buChar char="🧐"/>
+            </a:pPr>
             <a:r>
               <a:rPr lang="en-US" dirty="0"/>
               <a:t>Write separate tests for everything?</a:t>
             </a:r>
           </a:p>
           <a:p>
+            <a:pPr marL="457200" indent="-457200">
+              <a:buSzPct val="80000"/>
+              <a:buFont typeface="System Font Regular"/>
+              <a:buChar char="🧠"/>
+            </a:pPr>
             <a:endParaRPr lang="en-US" dirty="0"/>
           </a:p>
           <a:p>
+            <a:pPr marL="457200" indent="-457200">
+              <a:buSzPct val="80000"/>
+              <a:buFont typeface="System Font Regular"/>
+              <a:buChar char="🛠️"/>
+            </a:pPr>
             <a:r>
               <a:rPr lang="en-US" dirty="0"/>
               <a:t>Virtually every programming language has a special tool for this purpose called the “debugger”!</a:t>
@@ -13264,1160 +13246,6 @@
     <p:extLst>
       <p:ext uri="{BB962C8B-B14F-4D97-AF65-F5344CB8AC3E}">
         <p14:creationId xmlns:p14="http://schemas.microsoft.com/office/powerpoint/2010/main" val="1032396404"/>
-      </p:ext>
-    </p:extLst>
-  </p:cSld>
-  <p:clrMapOvr>
-    <a:masterClrMapping/>
-  </p:clrMapOvr>
-  <mc:AlternateContent xmlns:mc="http://schemas.openxmlformats.org/markup-compatibility/2006" xmlns:p14="http://schemas.microsoft.com/office/powerpoint/2010/main">
-    <mc:Choice Requires="p14">
-      <p:transition spd="med" p14:dur="700">
-        <p:fade/>
-      </p:transition>
-    </mc:Choice>
-    <mc:Fallback xmlns="">
-      <p:transition spd="med">
-        <p:fade/>
-      </p:transition>
-    </mc:Fallback>
-  </mc:AlternateContent>
-  <p:timing>
-    <p:tnLst>
-      <p:par>
-        <p:cTn id="1" dur="indefinite" restart="never" nodeType="tmRoot">
-          <p:childTnLst>
-            <p:seq concurrent="1" nextAc="seek">
-              <p:cTn id="2" dur="indefinite" nodeType="mainSeq">
-                <p:childTnLst>
-                  <p:par>
-                    <p:cTn id="3" fill="hold">
-                      <p:stCondLst>
-                        <p:cond delay="indefinite"/>
-                      </p:stCondLst>
-                      <p:childTnLst>
-                        <p:par>
-                          <p:cTn id="4" fill="hold">
-                            <p:stCondLst>
-                              <p:cond delay="0"/>
-                            </p:stCondLst>
-                            <p:childTnLst>
-                              <p:par>
-                                <p:cTn id="5" presetID="10" presetClass="exit" presetSubtype="0" fill="hold" grpId="0" nodeType="clickEffect">
-                                  <p:stCondLst>
-                                    <p:cond delay="0"/>
-                                  </p:stCondLst>
-                                  <p:childTnLst>
-                                    <p:animEffect transition="out" filter="fade">
-                                      <p:cBhvr>
-                                        <p:cTn id="6" dur="500"/>
-                                        <p:tgtEl>
-                                          <p:spTgt spid="7"/>
-                                        </p:tgtEl>
-                                      </p:cBhvr>
-                                    </p:animEffect>
-                                    <p:set>
-                                      <p:cBhvr>
-                                        <p:cTn id="7" dur="1" fill="hold">
-                                          <p:stCondLst>
-                                            <p:cond delay="499"/>
-                                          </p:stCondLst>
-                                        </p:cTn>
-                                        <p:tgtEl>
-                                          <p:spTgt spid="7"/>
-                                        </p:tgtEl>
-                                        <p:attrNameLst>
-                                          <p:attrName>style.visibility</p:attrName>
-                                        </p:attrNameLst>
-                                      </p:cBhvr>
-                                      <p:to>
-                                        <p:strVal val="hidden"/>
-                                      </p:to>
-                                    </p:set>
-                                  </p:childTnLst>
-                                </p:cTn>
-                              </p:par>
-                            </p:childTnLst>
-                          </p:cTn>
-                        </p:par>
-                      </p:childTnLst>
-                    </p:cTn>
-                  </p:par>
-                </p:childTnLst>
-              </p:cTn>
-              <p:prevCondLst>
-                <p:cond evt="onPrev" delay="0">
-                  <p:tgtEl>
-                    <p:sldTgt/>
-                  </p:tgtEl>
-                </p:cond>
-              </p:prevCondLst>
-              <p:nextCondLst>
-                <p:cond evt="onNext" delay="0">
-                  <p:tgtEl>
-                    <p:sldTgt/>
-                  </p:tgtEl>
-                </p:cond>
-              </p:nextCondLst>
-            </p:seq>
-          </p:childTnLst>
-        </p:cTn>
-      </p:par>
-    </p:tnLst>
-    <p:bldLst>
-      <p:bldP spid="7" grpId="0" animBg="1"/>
-    </p:bldLst>
-  </p:timing>
-</p:sld>
-</file>
-
-<file path=ppt/slides/slide6.xml><?xml version="1.0" encoding="utf-8"?>
-<p:sld xmlns:a="http://schemas.openxmlformats.org/drawingml/2006/main" xmlns:r="http://schemas.openxmlformats.org/officeDocument/2006/relationships" xmlns:p="http://schemas.openxmlformats.org/presentationml/2006/main">
-  <p:cSld>
-    <p:spTree>
-      <p:nvGrpSpPr>
-        <p:cNvPr id="1" name=""/>
-        <p:cNvGrpSpPr/>
-        <p:nvPr/>
-      </p:nvGrpSpPr>
-      <p:grpSpPr>
-        <a:xfrm>
-          <a:off x="0" y="0"/>
-          <a:ext cx="0" cy="0"/>
-          <a:chOff x="0" y="0"/>
-          <a:chExt cx="0" cy="0"/>
-        </a:xfrm>
-      </p:grpSpPr>
-      <p:sp>
-        <p:nvSpPr>
-          <p:cNvPr id="2" name="Content Placeholder 1">
-            <a:extLst>
-              <a:ext uri="{FF2B5EF4-FFF2-40B4-BE49-F238E27FC236}">
-                <a16:creationId xmlns:a16="http://schemas.microsoft.com/office/drawing/2014/main" id="{7B711598-7A76-81B7-BBB1-2B6A53A6093B}"/>
-              </a:ext>
-            </a:extLst>
-          </p:cNvPr>
-          <p:cNvSpPr>
-            <a:spLocks noGrp="1"/>
-          </p:cNvSpPr>
-          <p:nvPr>
-            <p:ph sz="quarter" idx="11"/>
-          </p:nvPr>
-        </p:nvSpPr>
-        <p:spPr/>
-        <p:txBody>
-          <a:bodyPr/>
-          <a:lstStyle/>
-          <a:p>
-            <a:r>
-              <a:rPr lang="en-US" dirty="0"/>
-              <a:t>A program that sits between your code and the Python interpreter</a:t>
-            </a:r>
-          </a:p>
-          <a:p>
-            <a:r>
-              <a:rPr lang="en-US" dirty="0"/>
-              <a:t>One such program comes with Python: </a:t>
-            </a:r>
-            <a:r>
-              <a:rPr lang="en-US" dirty="0" err="1">
-                <a:latin typeface="Menlo" panose="020B0609030804020204" pitchFamily="49" charset="0"/>
-                <a:ea typeface="Menlo" panose="020B0609030804020204" pitchFamily="49" charset="0"/>
-                <a:cs typeface="Menlo" panose="020B0609030804020204" pitchFamily="49" charset="0"/>
-              </a:rPr>
-              <a:t>pdb</a:t>
-            </a:r>
-            <a:endParaRPr lang="en-US" dirty="0">
-              <a:latin typeface="Menlo" panose="020B0609030804020204" pitchFamily="49" charset="0"/>
-              <a:ea typeface="Menlo" panose="020B0609030804020204" pitchFamily="49" charset="0"/>
-              <a:cs typeface="Menlo" panose="020B0609030804020204" pitchFamily="49" charset="0"/>
-            </a:endParaRPr>
-          </a:p>
-          <a:p>
-            <a:pPr lvl="1"/>
-            <a:r>
-              <a:rPr lang="en-US" dirty="0">
-                <a:latin typeface="Menlo" panose="020B0609030804020204" pitchFamily="49" charset="0"/>
-                <a:ea typeface="Menlo" panose="020B0609030804020204" pitchFamily="49" charset="0"/>
-                <a:cs typeface="Menlo" panose="020B0609030804020204" pitchFamily="49" charset="0"/>
-              </a:rPr>
-              <a:t>Lightweight an</a:t>
-            </a:r>
-          </a:p>
-          <a:p>
-            <a:r>
-              <a:rPr lang="en-US" dirty="0"/>
-              <a:t>VS Code comes with its own implementation called </a:t>
-            </a:r>
-            <a:r>
-              <a:rPr lang="en-US" dirty="0" err="1">
-                <a:latin typeface="Menlo" panose="020B0609030804020204" pitchFamily="49" charset="0"/>
-                <a:ea typeface="Menlo" panose="020B0609030804020204" pitchFamily="49" charset="0"/>
-                <a:cs typeface="Menlo" panose="020B0609030804020204" pitchFamily="49" charset="0"/>
-              </a:rPr>
-              <a:t>debugpy</a:t>
-            </a:r>
-            <a:endParaRPr lang="en-US" dirty="0">
-              <a:latin typeface="Menlo" panose="020B0609030804020204" pitchFamily="49" charset="0"/>
-              <a:ea typeface="Menlo" panose="020B0609030804020204" pitchFamily="49" charset="0"/>
-              <a:cs typeface="Menlo" panose="020B0609030804020204" pitchFamily="49" charset="0"/>
-            </a:endParaRPr>
-          </a:p>
-        </p:txBody>
-      </p:sp>
-      <p:sp>
-        <p:nvSpPr>
-          <p:cNvPr id="3" name="Title 2">
-            <a:extLst>
-              <a:ext uri="{FF2B5EF4-FFF2-40B4-BE49-F238E27FC236}">
-                <a16:creationId xmlns:a16="http://schemas.microsoft.com/office/drawing/2014/main" id="{7E20A32A-AE0B-11CE-3197-E2B83043F824}"/>
-              </a:ext>
-            </a:extLst>
-          </p:cNvPr>
-          <p:cNvSpPr>
-            <a:spLocks noGrp="1"/>
-          </p:cNvSpPr>
-          <p:nvPr>
-            <p:ph type="title"/>
-          </p:nvPr>
-        </p:nvSpPr>
-        <p:spPr/>
-        <p:txBody>
-          <a:bodyPr/>
-          <a:lstStyle/>
-          <a:p>
-            <a:r>
-              <a:rPr lang="en-US" dirty="0"/>
-              <a:t>The Debugger (in Python)</a:t>
-            </a:r>
-          </a:p>
-        </p:txBody>
-      </p:sp>
-      <p:sp>
-        <p:nvSpPr>
-          <p:cNvPr id="4" name="Footer Placeholder 3">
-            <a:extLst>
-              <a:ext uri="{FF2B5EF4-FFF2-40B4-BE49-F238E27FC236}">
-                <a16:creationId xmlns:a16="http://schemas.microsoft.com/office/drawing/2014/main" id="{C1FF5CD9-D816-D547-BCCE-7202CF3FCB81}"/>
-              </a:ext>
-            </a:extLst>
-          </p:cNvPr>
-          <p:cNvSpPr>
-            <a:spLocks noGrp="1"/>
-          </p:cNvSpPr>
-          <p:nvPr>
-            <p:ph type="ftr" sz="quarter" idx="12"/>
-          </p:nvPr>
-        </p:nvSpPr>
-        <p:spPr/>
-        <p:txBody>
-          <a:bodyPr/>
-          <a:lstStyle/>
-          <a:p>
-            <a:r>
-              <a:rPr lang="en-AU"/>
-              <a:t>Debugging Superpowers in Python</a:t>
-            </a:r>
-            <a:endParaRPr lang="en-AU" dirty="0"/>
-          </a:p>
-        </p:txBody>
-      </p:sp>
-      <p:sp>
-        <p:nvSpPr>
-          <p:cNvPr id="5" name="Slide Number Placeholder 4">
-            <a:extLst>
-              <a:ext uri="{FF2B5EF4-FFF2-40B4-BE49-F238E27FC236}">
-                <a16:creationId xmlns:a16="http://schemas.microsoft.com/office/drawing/2014/main" id="{7F280414-60D2-D09F-C565-72FB4EF68C1B}"/>
-              </a:ext>
-            </a:extLst>
-          </p:cNvPr>
-          <p:cNvSpPr>
-            <a:spLocks noGrp="1"/>
-          </p:cNvSpPr>
-          <p:nvPr>
-            <p:ph type="sldNum" sz="quarter" idx="13"/>
-          </p:nvPr>
-        </p:nvSpPr>
-        <p:spPr/>
-        <p:txBody>
-          <a:bodyPr/>
-          <a:lstStyle/>
-          <a:p>
-            <a:fld id="{E917DE0E-AFB1-41FD-BC35-27DB61CA125F}" type="slidenum">
-              <a:rPr lang="en-AU" smtClean="0"/>
-              <a:pPr/>
-              <a:t>6</a:t>
-            </a:fld>
-            <a:endParaRPr lang="en-AU" dirty="0"/>
-          </a:p>
-        </p:txBody>
-      </p:sp>
-    </p:spTree>
-    <p:extLst>
-      <p:ext uri="{BB962C8B-B14F-4D97-AF65-F5344CB8AC3E}">
-        <p14:creationId xmlns:p14="http://schemas.microsoft.com/office/powerpoint/2010/main" val="842322863"/>
-      </p:ext>
-    </p:extLst>
-  </p:cSld>
-  <p:clrMapOvr>
-    <a:masterClrMapping/>
-  </p:clrMapOvr>
-  <mc:AlternateContent xmlns:mc="http://schemas.openxmlformats.org/markup-compatibility/2006" xmlns:p14="http://schemas.microsoft.com/office/powerpoint/2010/main">
-    <mc:Choice Requires="p14">
-      <p:transition spd="med" p14:dur="700">
-        <p:fade/>
-      </p:transition>
-    </mc:Choice>
-    <mc:Fallback xmlns="">
-      <p:transition spd="med">
-        <p:fade/>
-      </p:transition>
-    </mc:Fallback>
-  </mc:AlternateContent>
-</p:sld>
-</file>
-
-<file path=ppt/slides/slide7.xml><?xml version="1.0" encoding="utf-8"?>
-<p:sld xmlns:a="http://schemas.openxmlformats.org/drawingml/2006/main" xmlns:r="http://schemas.openxmlformats.org/officeDocument/2006/relationships" xmlns:p="http://schemas.openxmlformats.org/presentationml/2006/main">
-  <p:cSld>
-    <p:spTree>
-      <p:nvGrpSpPr>
-        <p:cNvPr id="1" name="">
-          <a:extLst>
-            <a:ext uri="{FF2B5EF4-FFF2-40B4-BE49-F238E27FC236}">
-              <a16:creationId xmlns:a16="http://schemas.microsoft.com/office/drawing/2014/main" id="{252637AF-5AEE-5B83-3E3E-295646DE945F}"/>
-            </a:ext>
-          </a:extLst>
-        </p:cNvPr>
-        <p:cNvGrpSpPr/>
-        <p:nvPr/>
-      </p:nvGrpSpPr>
-      <p:grpSpPr>
-        <a:xfrm>
-          <a:off x="0" y="0"/>
-          <a:ext cx="0" cy="0"/>
-          <a:chOff x="0" y="0"/>
-          <a:chExt cx="0" cy="0"/>
-        </a:xfrm>
-      </p:grpSpPr>
-      <p:sp>
-        <p:nvSpPr>
-          <p:cNvPr id="2" name="Content Placeholder 1">
-            <a:extLst>
-              <a:ext uri="{FF2B5EF4-FFF2-40B4-BE49-F238E27FC236}">
-                <a16:creationId xmlns:a16="http://schemas.microsoft.com/office/drawing/2014/main" id="{30C53F86-585A-E35C-C169-589B447E4CBB}"/>
-              </a:ext>
-            </a:extLst>
-          </p:cNvPr>
-          <p:cNvSpPr>
-            <a:spLocks noGrp="1"/>
-          </p:cNvSpPr>
-          <p:nvPr>
-            <p:ph sz="quarter" idx="11"/>
-          </p:nvPr>
-        </p:nvSpPr>
-        <p:spPr/>
-        <p:txBody>
-          <a:bodyPr>
-            <a:normAutofit/>
-          </a:bodyPr>
-          <a:lstStyle/>
-          <a:p>
-            <a:pPr marL="350838" indent="-339725">
-              <a:buSzPct val="80000"/>
-              <a:buFont typeface="System Font Regular"/>
-              <a:buChar char="🔥"/>
-            </a:pPr>
-            <a:r>
-              <a:rPr lang="en-US" dirty="0"/>
-              <a:t>If you don’t test, you are testing in production</a:t>
-            </a:r>
-          </a:p>
-          <a:p>
-            <a:pPr marL="350838" indent="-339725">
-              <a:buSzPct val="80000"/>
-              <a:buFont typeface="System Font Regular"/>
-              <a:buChar char="😇"/>
-            </a:pPr>
-            <a:r>
-              <a:rPr lang="en-US" dirty="0"/>
-              <a:t>Ensure desired behavior</a:t>
-            </a:r>
-          </a:p>
-          <a:p>
-            <a:pPr marL="350838" indent="-339725">
-              <a:buSzPct val="80000"/>
-              <a:buFont typeface="System Font Regular"/>
-              <a:buChar char="🐛"/>
-            </a:pPr>
-            <a:r>
-              <a:rPr lang="en-US" dirty="0"/>
-              <a:t>Discover and squash bugs</a:t>
-            </a:r>
-          </a:p>
-          <a:p>
-            <a:pPr marL="350838" indent="-339725">
-              <a:buSzPct val="80000"/>
-              <a:buFont typeface="System Font Regular"/>
-              <a:buChar char="🌱"/>
-            </a:pPr>
-            <a:r>
-              <a:rPr lang="en-US" dirty="0"/>
-              <a:t>Grow your codebase without breaking existing things</a:t>
-            </a:r>
-          </a:p>
-          <a:p>
-            <a:pPr marL="350838" indent="-339725">
-              <a:buSzPct val="80000"/>
-              <a:buFont typeface="System Font Regular"/>
-              <a:buChar char="📄"/>
-            </a:pPr>
-            <a:r>
-              <a:rPr lang="en-US" dirty="0"/>
-              <a:t>Tests document how your code can be used</a:t>
-            </a:r>
-          </a:p>
-          <a:p>
-            <a:pPr marL="350838" indent="-339725">
-              <a:buSzPct val="80000"/>
-              <a:buFont typeface="System Font Regular"/>
-              <a:buChar char="💡"/>
-            </a:pPr>
-            <a:r>
-              <a:rPr lang="en-US" dirty="0"/>
-              <a:t>Tests can help discover awkward interfaces or coupling</a:t>
-            </a:r>
-          </a:p>
-          <a:p>
-            <a:endParaRPr lang="en-US" dirty="0"/>
-          </a:p>
-        </p:txBody>
-      </p:sp>
-      <p:sp>
-        <p:nvSpPr>
-          <p:cNvPr id="3" name="Title 2">
-            <a:extLst>
-              <a:ext uri="{FF2B5EF4-FFF2-40B4-BE49-F238E27FC236}">
-                <a16:creationId xmlns:a16="http://schemas.microsoft.com/office/drawing/2014/main" id="{B9BA024F-643D-F028-481E-F02FAA131766}"/>
-              </a:ext>
-            </a:extLst>
-          </p:cNvPr>
-          <p:cNvSpPr>
-            <a:spLocks noGrp="1"/>
-          </p:cNvSpPr>
-          <p:nvPr>
-            <p:ph type="title"/>
-          </p:nvPr>
-        </p:nvSpPr>
-        <p:spPr/>
-        <p:txBody>
-          <a:bodyPr/>
-          <a:lstStyle/>
-          <a:p>
-            <a:r>
-              <a:rPr lang="en-US" dirty="0"/>
-              <a:t>Why test your code?</a:t>
-            </a:r>
-          </a:p>
-        </p:txBody>
-      </p:sp>
-      <p:sp>
-        <p:nvSpPr>
-          <p:cNvPr id="4" name="Footer Placeholder 3">
-            <a:extLst>
-              <a:ext uri="{FF2B5EF4-FFF2-40B4-BE49-F238E27FC236}">
-                <a16:creationId xmlns:a16="http://schemas.microsoft.com/office/drawing/2014/main" id="{80E9EE2B-DE8C-2B8F-899C-8D633E28F2F5}"/>
-              </a:ext>
-            </a:extLst>
-          </p:cNvPr>
-          <p:cNvSpPr>
-            <a:spLocks noGrp="1"/>
-          </p:cNvSpPr>
-          <p:nvPr>
-            <p:ph type="ftr" sz="quarter" idx="12"/>
-          </p:nvPr>
-        </p:nvSpPr>
-        <p:spPr/>
-        <p:txBody>
-          <a:bodyPr/>
-          <a:lstStyle/>
-          <a:p>
-            <a:r>
-              <a:rPr lang="en-AU"/>
-              <a:t>Debugging Superpowers in Python</a:t>
-            </a:r>
-            <a:endParaRPr lang="en-AU" dirty="0"/>
-          </a:p>
-        </p:txBody>
-      </p:sp>
-      <p:sp>
-        <p:nvSpPr>
-          <p:cNvPr id="5" name="Slide Number Placeholder 4">
-            <a:extLst>
-              <a:ext uri="{FF2B5EF4-FFF2-40B4-BE49-F238E27FC236}">
-                <a16:creationId xmlns:a16="http://schemas.microsoft.com/office/drawing/2014/main" id="{CF7FA78E-86D0-310B-6453-BC2FE4A84DD3}"/>
-              </a:ext>
-            </a:extLst>
-          </p:cNvPr>
-          <p:cNvSpPr>
-            <a:spLocks noGrp="1"/>
-          </p:cNvSpPr>
-          <p:nvPr>
-            <p:ph type="sldNum" sz="quarter" idx="13"/>
-          </p:nvPr>
-        </p:nvSpPr>
-        <p:spPr/>
-        <p:txBody>
-          <a:bodyPr/>
-          <a:lstStyle/>
-          <a:p>
-            <a:fld id="{E917DE0E-AFB1-41FD-BC35-27DB61CA125F}" type="slidenum">
-              <a:rPr lang="en-AU" smtClean="0"/>
-              <a:pPr/>
-              <a:t>7</a:t>
-            </a:fld>
-            <a:endParaRPr lang="en-AU" dirty="0"/>
-          </a:p>
-        </p:txBody>
-      </p:sp>
-    </p:spTree>
-    <p:extLst>
-      <p:ext uri="{BB962C8B-B14F-4D97-AF65-F5344CB8AC3E}">
-        <p14:creationId xmlns:p14="http://schemas.microsoft.com/office/powerpoint/2010/main" val="3245977189"/>
-      </p:ext>
-    </p:extLst>
-  </p:cSld>
-  <p:clrMapOvr>
-    <a:masterClrMapping/>
-  </p:clrMapOvr>
-  <mc:AlternateContent xmlns:mc="http://schemas.openxmlformats.org/markup-compatibility/2006" xmlns:p14="http://schemas.microsoft.com/office/powerpoint/2010/main">
-    <mc:Choice Requires="p14">
-      <p:transition spd="med" p14:dur="700">
-        <p:fade/>
-      </p:transition>
-    </mc:Choice>
-    <mc:Fallback xmlns="">
-      <p:transition spd="med">
-        <p:fade/>
-      </p:transition>
-    </mc:Fallback>
-  </mc:AlternateContent>
-  <p:timing>
-    <p:tnLst>
-      <p:par>
-        <p:cTn id="1" dur="indefinite" restart="never" nodeType="tmRoot">
-          <p:childTnLst>
-            <p:seq concurrent="1" nextAc="seek">
-              <p:cTn id="2" dur="indefinite" nodeType="mainSeq">
-                <p:childTnLst>
-                  <p:par>
-                    <p:cTn id="3" fill="hold">
-                      <p:stCondLst>
-                        <p:cond delay="indefinite"/>
-                      </p:stCondLst>
-                      <p:childTnLst>
-                        <p:par>
-                          <p:cTn id="4" fill="hold">
-                            <p:stCondLst>
-                              <p:cond delay="0"/>
-                            </p:stCondLst>
-                            <p:childTnLst>
-                              <p:par>
-                                <p:cTn id="5" presetID="10" presetClass="entr" presetSubtype="0" fill="hold" nodeType="clickEffect">
-                                  <p:stCondLst>
-                                    <p:cond delay="0"/>
-                                  </p:stCondLst>
-                                  <p:childTnLst>
-                                    <p:set>
-                                      <p:cBhvr>
-                                        <p:cTn id="6" dur="1" fill="hold">
-                                          <p:stCondLst>
-                                            <p:cond delay="0"/>
-                                          </p:stCondLst>
-                                        </p:cTn>
-                                        <p:tgtEl>
-                                          <p:spTgt spid="2">
-                                            <p:txEl>
-                                              <p:pRg st="1" end="1"/>
-                                            </p:txEl>
-                                          </p:spTgt>
-                                        </p:tgtEl>
-                                        <p:attrNameLst>
-                                          <p:attrName>style.visibility</p:attrName>
-                                        </p:attrNameLst>
-                                      </p:cBhvr>
-                                      <p:to>
-                                        <p:strVal val="visible"/>
-                                      </p:to>
-                                    </p:set>
-                                    <p:animEffect transition="in" filter="fade">
-                                      <p:cBhvr>
-                                        <p:cTn id="7" dur="500"/>
-                                        <p:tgtEl>
-                                          <p:spTgt spid="2">
-                                            <p:txEl>
-                                              <p:pRg st="1" end="1"/>
-                                            </p:txEl>
-                                          </p:spTgt>
-                                        </p:tgtEl>
-                                      </p:cBhvr>
-                                    </p:animEffect>
-                                  </p:childTnLst>
-                                </p:cTn>
-                              </p:par>
-                            </p:childTnLst>
-                          </p:cTn>
-                        </p:par>
-                      </p:childTnLst>
-                    </p:cTn>
-                  </p:par>
-                  <p:par>
-                    <p:cTn id="8" fill="hold">
-                      <p:stCondLst>
-                        <p:cond delay="indefinite"/>
-                      </p:stCondLst>
-                      <p:childTnLst>
-                        <p:par>
-                          <p:cTn id="9" fill="hold">
-                            <p:stCondLst>
-                              <p:cond delay="0"/>
-                            </p:stCondLst>
-                            <p:childTnLst>
-                              <p:par>
-                                <p:cTn id="10" presetID="10" presetClass="entr" presetSubtype="0" fill="hold" nodeType="clickEffect">
-                                  <p:stCondLst>
-                                    <p:cond delay="0"/>
-                                  </p:stCondLst>
-                                  <p:childTnLst>
-                                    <p:set>
-                                      <p:cBhvr>
-                                        <p:cTn id="11" dur="1" fill="hold">
-                                          <p:stCondLst>
-                                            <p:cond delay="0"/>
-                                          </p:stCondLst>
-                                        </p:cTn>
-                                        <p:tgtEl>
-                                          <p:spTgt spid="2">
-                                            <p:txEl>
-                                              <p:pRg st="2" end="2"/>
-                                            </p:txEl>
-                                          </p:spTgt>
-                                        </p:tgtEl>
-                                        <p:attrNameLst>
-                                          <p:attrName>style.visibility</p:attrName>
-                                        </p:attrNameLst>
-                                      </p:cBhvr>
-                                      <p:to>
-                                        <p:strVal val="visible"/>
-                                      </p:to>
-                                    </p:set>
-                                    <p:animEffect transition="in" filter="fade">
-                                      <p:cBhvr>
-                                        <p:cTn id="12" dur="500"/>
-                                        <p:tgtEl>
-                                          <p:spTgt spid="2">
-                                            <p:txEl>
-                                              <p:pRg st="2" end="2"/>
-                                            </p:txEl>
-                                          </p:spTgt>
-                                        </p:tgtEl>
-                                      </p:cBhvr>
-                                    </p:animEffect>
-                                  </p:childTnLst>
-                                </p:cTn>
-                              </p:par>
-                            </p:childTnLst>
-                          </p:cTn>
-                        </p:par>
-                      </p:childTnLst>
-                    </p:cTn>
-                  </p:par>
-                  <p:par>
-                    <p:cTn id="13" fill="hold">
-                      <p:stCondLst>
-                        <p:cond delay="indefinite"/>
-                      </p:stCondLst>
-                      <p:childTnLst>
-                        <p:par>
-                          <p:cTn id="14" fill="hold">
-                            <p:stCondLst>
-                              <p:cond delay="0"/>
-                            </p:stCondLst>
-                            <p:childTnLst>
-                              <p:par>
-                                <p:cTn id="15" presetID="10" presetClass="entr" presetSubtype="0" fill="hold" nodeType="clickEffect">
-                                  <p:stCondLst>
-                                    <p:cond delay="0"/>
-                                  </p:stCondLst>
-                                  <p:childTnLst>
-                                    <p:set>
-                                      <p:cBhvr>
-                                        <p:cTn id="16" dur="1" fill="hold">
-                                          <p:stCondLst>
-                                            <p:cond delay="0"/>
-                                          </p:stCondLst>
-                                        </p:cTn>
-                                        <p:tgtEl>
-                                          <p:spTgt spid="2">
-                                            <p:txEl>
-                                              <p:pRg st="3" end="3"/>
-                                            </p:txEl>
-                                          </p:spTgt>
-                                        </p:tgtEl>
-                                        <p:attrNameLst>
-                                          <p:attrName>style.visibility</p:attrName>
-                                        </p:attrNameLst>
-                                      </p:cBhvr>
-                                      <p:to>
-                                        <p:strVal val="visible"/>
-                                      </p:to>
-                                    </p:set>
-                                    <p:animEffect transition="in" filter="fade">
-                                      <p:cBhvr>
-                                        <p:cTn id="17" dur="500"/>
-                                        <p:tgtEl>
-                                          <p:spTgt spid="2">
-                                            <p:txEl>
-                                              <p:pRg st="3" end="3"/>
-                                            </p:txEl>
-                                          </p:spTgt>
-                                        </p:tgtEl>
-                                      </p:cBhvr>
-                                    </p:animEffect>
-                                  </p:childTnLst>
-                                </p:cTn>
-                              </p:par>
-                            </p:childTnLst>
-                          </p:cTn>
-                        </p:par>
-                      </p:childTnLst>
-                    </p:cTn>
-                  </p:par>
-                  <p:par>
-                    <p:cTn id="18" fill="hold">
-                      <p:stCondLst>
-                        <p:cond delay="indefinite"/>
-                      </p:stCondLst>
-                      <p:childTnLst>
-                        <p:par>
-                          <p:cTn id="19" fill="hold">
-                            <p:stCondLst>
-                              <p:cond delay="0"/>
-                            </p:stCondLst>
-                            <p:childTnLst>
-                              <p:par>
-                                <p:cTn id="20" presetID="10" presetClass="entr" presetSubtype="0" fill="hold" nodeType="clickEffect">
-                                  <p:stCondLst>
-                                    <p:cond delay="0"/>
-                                  </p:stCondLst>
-                                  <p:childTnLst>
-                                    <p:set>
-                                      <p:cBhvr>
-                                        <p:cTn id="21" dur="1" fill="hold">
-                                          <p:stCondLst>
-                                            <p:cond delay="0"/>
-                                          </p:stCondLst>
-                                        </p:cTn>
-                                        <p:tgtEl>
-                                          <p:spTgt spid="2">
-                                            <p:txEl>
-                                              <p:pRg st="4" end="4"/>
-                                            </p:txEl>
-                                          </p:spTgt>
-                                        </p:tgtEl>
-                                        <p:attrNameLst>
-                                          <p:attrName>style.visibility</p:attrName>
-                                        </p:attrNameLst>
-                                      </p:cBhvr>
-                                      <p:to>
-                                        <p:strVal val="visible"/>
-                                      </p:to>
-                                    </p:set>
-                                    <p:animEffect transition="in" filter="fade">
-                                      <p:cBhvr>
-                                        <p:cTn id="22" dur="500"/>
-                                        <p:tgtEl>
-                                          <p:spTgt spid="2">
-                                            <p:txEl>
-                                              <p:pRg st="4" end="4"/>
-                                            </p:txEl>
-                                          </p:spTgt>
-                                        </p:tgtEl>
-                                      </p:cBhvr>
-                                    </p:animEffect>
-                                  </p:childTnLst>
-                                </p:cTn>
-                              </p:par>
-                            </p:childTnLst>
-                          </p:cTn>
-                        </p:par>
-                      </p:childTnLst>
-                    </p:cTn>
-                  </p:par>
-                  <p:par>
-                    <p:cTn id="23" fill="hold">
-                      <p:stCondLst>
-                        <p:cond delay="indefinite"/>
-                      </p:stCondLst>
-                      <p:childTnLst>
-                        <p:par>
-                          <p:cTn id="24" fill="hold">
-                            <p:stCondLst>
-                              <p:cond delay="0"/>
-                            </p:stCondLst>
-                            <p:childTnLst>
-                              <p:par>
-                                <p:cTn id="25" presetID="10" presetClass="entr" presetSubtype="0" fill="hold" nodeType="clickEffect">
-                                  <p:stCondLst>
-                                    <p:cond delay="0"/>
-                                  </p:stCondLst>
-                                  <p:childTnLst>
-                                    <p:set>
-                                      <p:cBhvr>
-                                        <p:cTn id="26" dur="1" fill="hold">
-                                          <p:stCondLst>
-                                            <p:cond delay="0"/>
-                                          </p:stCondLst>
-                                        </p:cTn>
-                                        <p:tgtEl>
-                                          <p:spTgt spid="2">
-                                            <p:txEl>
-                                              <p:pRg st="5" end="5"/>
-                                            </p:txEl>
-                                          </p:spTgt>
-                                        </p:tgtEl>
-                                        <p:attrNameLst>
-                                          <p:attrName>style.visibility</p:attrName>
-                                        </p:attrNameLst>
-                                      </p:cBhvr>
-                                      <p:to>
-                                        <p:strVal val="visible"/>
-                                      </p:to>
-                                    </p:set>
-                                    <p:animEffect transition="in" filter="fade">
-                                      <p:cBhvr>
-                                        <p:cTn id="27" dur="500"/>
-                                        <p:tgtEl>
-                                          <p:spTgt spid="2">
-                                            <p:txEl>
-                                              <p:pRg st="5" end="5"/>
-                                            </p:txEl>
-                                          </p:spTgt>
-                                        </p:tgtEl>
-                                      </p:cBhvr>
-                                    </p:animEffect>
-                                  </p:childTnLst>
-                                </p:cTn>
-                              </p:par>
-                            </p:childTnLst>
-                          </p:cTn>
-                        </p:par>
-                      </p:childTnLst>
-                    </p:cTn>
-                  </p:par>
-                </p:childTnLst>
-              </p:cTn>
-              <p:prevCondLst>
-                <p:cond evt="onPrev" delay="0">
-                  <p:tgtEl>
-                    <p:sldTgt/>
-                  </p:tgtEl>
-                </p:cond>
-              </p:prevCondLst>
-              <p:nextCondLst>
-                <p:cond evt="onNext" delay="0">
-                  <p:tgtEl>
-                    <p:sldTgt/>
-                  </p:tgtEl>
-                </p:cond>
-              </p:nextCondLst>
-            </p:seq>
-          </p:childTnLst>
-        </p:cTn>
-      </p:par>
-    </p:tnLst>
-  </p:timing>
-</p:sld>
-</file>
-
-<file path=ppt/slides/slide8.xml><?xml version="1.0" encoding="utf-8"?>
-<p:sld xmlns:a="http://schemas.openxmlformats.org/drawingml/2006/main" xmlns:r="http://schemas.openxmlformats.org/officeDocument/2006/relationships" xmlns:p="http://schemas.openxmlformats.org/presentationml/2006/main">
-  <p:cSld>
-    <p:spTree>
-      <p:nvGrpSpPr>
-        <p:cNvPr id="1" name=""/>
-        <p:cNvGrpSpPr/>
-        <p:nvPr/>
-      </p:nvGrpSpPr>
-      <p:grpSpPr>
-        <a:xfrm>
-          <a:off x="0" y="0"/>
-          <a:ext cx="0" cy="0"/>
-          <a:chOff x="0" y="0"/>
-          <a:chExt cx="0" cy="0"/>
-        </a:xfrm>
-      </p:grpSpPr>
-      <p:sp>
-        <p:nvSpPr>
-          <p:cNvPr id="2" name="Content Placeholder 1">
-            <a:extLst>
-              <a:ext uri="{FF2B5EF4-FFF2-40B4-BE49-F238E27FC236}">
-                <a16:creationId xmlns:a16="http://schemas.microsoft.com/office/drawing/2014/main" id="{3A9A1A45-5C7F-F015-DC1A-A15EECD0A02F}"/>
-              </a:ext>
-            </a:extLst>
-          </p:cNvPr>
-          <p:cNvSpPr>
-            <a:spLocks noGrp="1"/>
-          </p:cNvSpPr>
-          <p:nvPr>
-            <p:ph sz="quarter" idx="11"/>
-          </p:nvPr>
-        </p:nvSpPr>
-        <p:spPr>
-          <a:xfrm>
-            <a:off x="321508" y="2365639"/>
-            <a:ext cx="11546007" cy="3785724"/>
-          </a:xfrm>
-        </p:spPr>
-        <p:txBody>
-          <a:bodyPr>
-            <a:normAutofit fontScale="92500" lnSpcReduction="10000"/>
-          </a:bodyPr>
-          <a:lstStyle/>
-          <a:p>
-            <a:pPr marL="457200" indent="-457200">
-              <a:buSzPct val="80000"/>
-              <a:buFont typeface="System Font Regular"/>
-              <a:buChar char="👉"/>
-            </a:pPr>
-            <a:r>
-              <a:rPr lang="en-US" dirty="0"/>
-              <a:t>Core flow:</a:t>
-            </a:r>
-          </a:p>
-          <a:p>
-            <a:pPr marL="750888" lvl="1" indent="-342900">
-              <a:buSzPct val="80000"/>
-              <a:buFont typeface="System Font Regular"/>
-              <a:buChar char="✍️"/>
-            </a:pPr>
-            <a:r>
-              <a:rPr lang="en-US" dirty="0"/>
-              <a:t>Write tests first</a:t>
-            </a:r>
-          </a:p>
-          <a:p>
-            <a:pPr marL="747713" lvl="1" indent="-336550">
-              <a:buSzPct val="80000"/>
-              <a:buFont typeface="System Font Regular"/>
-              <a:buChar char="❌"/>
-            </a:pPr>
-            <a:r>
-              <a:rPr lang="en-US" dirty="0"/>
-              <a:t>Fail all tests</a:t>
-            </a:r>
-          </a:p>
-          <a:p>
-            <a:pPr marL="747713" lvl="1" indent="-339725">
-              <a:buSzPct val="80000"/>
-              <a:buFont typeface="System Font Regular"/>
-              <a:buChar char="👶"/>
-            </a:pPr>
-            <a:r>
-              <a:rPr lang="en-US" dirty="0"/>
-              <a:t>Implement the simplest code to pass all tests</a:t>
-            </a:r>
-          </a:p>
-          <a:p>
-            <a:pPr marL="747713" lvl="1" indent="-336550">
-              <a:buSzPct val="80000"/>
-              <a:buFont typeface="System Font Regular"/>
-              <a:buChar char="✅"/>
-            </a:pPr>
-            <a:r>
-              <a:rPr lang="en-US" dirty="0"/>
-              <a:t>Pass all tests</a:t>
-            </a:r>
-          </a:p>
-          <a:p>
-            <a:pPr marL="742950" lvl="1" indent="-331788">
-              <a:buSzPct val="80000"/>
-              <a:buFont typeface="System Font Regular"/>
-              <a:buChar char="✨"/>
-            </a:pPr>
-            <a:r>
-              <a:rPr lang="en-US" dirty="0"/>
-              <a:t>Refactor the implementation as needed</a:t>
-            </a:r>
-          </a:p>
-          <a:p>
-            <a:pPr marL="401638" indent="-392113">
-              <a:buSzPct val="80000"/>
-              <a:buFont typeface="System Font Regular"/>
-              <a:buChar char="🧐"/>
-            </a:pPr>
-            <a:r>
-              <a:rPr lang="en-US" dirty="0"/>
-              <a:t>See also: “Code towards an interface”, Backward Design</a:t>
-            </a:r>
-          </a:p>
-        </p:txBody>
-      </p:sp>
-      <p:sp>
-        <p:nvSpPr>
-          <p:cNvPr id="3" name="Title 2">
-            <a:extLst>
-              <a:ext uri="{FF2B5EF4-FFF2-40B4-BE49-F238E27FC236}">
-                <a16:creationId xmlns:a16="http://schemas.microsoft.com/office/drawing/2014/main" id="{C64B2E11-87BC-A845-5F23-3BF152FC05A0}"/>
-              </a:ext>
-            </a:extLst>
-          </p:cNvPr>
-          <p:cNvSpPr>
-            <a:spLocks noGrp="1"/>
-          </p:cNvSpPr>
-          <p:nvPr>
-            <p:ph type="title"/>
-          </p:nvPr>
-        </p:nvSpPr>
-        <p:spPr/>
-        <p:txBody>
-          <a:bodyPr/>
-          <a:lstStyle/>
-          <a:p>
-            <a:r>
-              <a:rPr lang="en-US" dirty="0"/>
-              <a:t>Test-Driven Development</a:t>
-            </a:r>
-          </a:p>
-        </p:txBody>
-      </p:sp>
-      <p:sp>
-        <p:nvSpPr>
-          <p:cNvPr id="4" name="Footer Placeholder 3">
-            <a:extLst>
-              <a:ext uri="{FF2B5EF4-FFF2-40B4-BE49-F238E27FC236}">
-                <a16:creationId xmlns:a16="http://schemas.microsoft.com/office/drawing/2014/main" id="{41C212C6-45D2-34A8-5C65-A1CD5B8C5DA6}"/>
-              </a:ext>
-            </a:extLst>
-          </p:cNvPr>
-          <p:cNvSpPr>
-            <a:spLocks noGrp="1"/>
-          </p:cNvSpPr>
-          <p:nvPr>
-            <p:ph type="ftr" sz="quarter" idx="12"/>
-          </p:nvPr>
-        </p:nvSpPr>
-        <p:spPr/>
-        <p:txBody>
-          <a:bodyPr/>
-          <a:lstStyle/>
-          <a:p>
-            <a:r>
-              <a:rPr lang="en-AU"/>
-              <a:t>Debugging Superpowers in Python</a:t>
-            </a:r>
-            <a:endParaRPr lang="en-AU" dirty="0"/>
-          </a:p>
-        </p:txBody>
-      </p:sp>
-      <p:sp>
-        <p:nvSpPr>
-          <p:cNvPr id="5" name="Slide Number Placeholder 4">
-            <a:extLst>
-              <a:ext uri="{FF2B5EF4-FFF2-40B4-BE49-F238E27FC236}">
-                <a16:creationId xmlns:a16="http://schemas.microsoft.com/office/drawing/2014/main" id="{420D6EAF-B8AE-FBEA-ED49-9728A7ED14F4}"/>
-              </a:ext>
-            </a:extLst>
-          </p:cNvPr>
-          <p:cNvSpPr>
-            <a:spLocks noGrp="1"/>
-          </p:cNvSpPr>
-          <p:nvPr>
-            <p:ph type="sldNum" sz="quarter" idx="13"/>
-          </p:nvPr>
-        </p:nvSpPr>
-        <p:spPr/>
-        <p:txBody>
-          <a:bodyPr/>
-          <a:lstStyle/>
-          <a:p>
-            <a:fld id="{E917DE0E-AFB1-41FD-BC35-27DB61CA125F}" type="slidenum">
-              <a:rPr lang="en-AU" smtClean="0"/>
-              <a:pPr/>
-              <a:t>8</a:t>
-            </a:fld>
-            <a:endParaRPr lang="en-AU" dirty="0"/>
-          </a:p>
-        </p:txBody>
-      </p:sp>
-      <p:sp>
-        <p:nvSpPr>
-          <p:cNvPr id="7" name="TextBox 6">
-            <a:extLst>
-              <a:ext uri="{FF2B5EF4-FFF2-40B4-BE49-F238E27FC236}">
-                <a16:creationId xmlns:a16="http://schemas.microsoft.com/office/drawing/2014/main" id="{A4D06E1D-B6A0-6D64-0F8F-B90D5C6F801F}"/>
-              </a:ext>
-            </a:extLst>
-          </p:cNvPr>
-          <p:cNvSpPr txBox="1"/>
-          <p:nvPr/>
-        </p:nvSpPr>
-        <p:spPr>
-          <a:xfrm>
-            <a:off x="336425" y="6151363"/>
-            <a:ext cx="11169775" cy="400110"/>
-          </a:xfrm>
-          <a:prstGeom prst="rect">
-            <a:avLst/>
-          </a:prstGeom>
-          <a:noFill/>
-        </p:spPr>
-        <p:txBody>
-          <a:bodyPr wrap="square">
-            <a:spAutoFit/>
-          </a:bodyPr>
-          <a:lstStyle/>
-          <a:p>
-            <a:r>
-              <a:rPr lang="en-US" sz="2000" dirty="0">
-                <a:solidFill>
-                  <a:schemeClr val="accent6">
-                    <a:lumMod val="75000"/>
-                  </a:schemeClr>
-                </a:solidFill>
-                <a:latin typeface="National 2" panose="020B0504030502020203" pitchFamily="34" charset="77"/>
-              </a:rPr>
-              <a:t>Beck, K. (2003). </a:t>
-            </a:r>
-            <a:r>
-              <a:rPr lang="en-US" sz="2000" i="1" dirty="0">
-                <a:solidFill>
-                  <a:schemeClr val="accent6">
-                    <a:lumMod val="75000"/>
-                  </a:schemeClr>
-                </a:solidFill>
-                <a:latin typeface="National 2" panose="020B0504030502020203" pitchFamily="34" charset="77"/>
-              </a:rPr>
-              <a:t>Test-driven development : by example</a:t>
-            </a:r>
-            <a:r>
-              <a:rPr lang="en-US" sz="2000" dirty="0">
-                <a:solidFill>
-                  <a:schemeClr val="accent6">
-                    <a:lumMod val="75000"/>
-                  </a:schemeClr>
-                </a:solidFill>
-                <a:latin typeface="National 2" panose="020B0504030502020203" pitchFamily="34" charset="77"/>
-              </a:rPr>
-              <a:t> (1st edition). Addison-Wesley.</a:t>
-            </a:r>
-          </a:p>
-        </p:txBody>
-      </p:sp>
-    </p:spTree>
-    <p:extLst>
-      <p:ext uri="{BB962C8B-B14F-4D97-AF65-F5344CB8AC3E}">
-        <p14:creationId xmlns:p14="http://schemas.microsoft.com/office/powerpoint/2010/main" val="2477666109"/>
       </p:ext>
     </p:extLst>
   </p:cSld>
@@ -14640,45 +13468,37 @@
                             </p:stCondLst>
                             <p:childTnLst>
                               <p:par>
-                                <p:cTn id="20" presetID="10" presetClass="entr" presetSubtype="0" fill="hold" grpId="0" nodeType="clickEffect">
+                                <p:cTn id="20" presetID="10" presetClass="exit" presetSubtype="0" fill="hold" grpId="0" nodeType="clickEffect">
                                   <p:stCondLst>
                                     <p:cond delay="0"/>
                                   </p:stCondLst>
                                   <p:childTnLst>
+                                    <p:animEffect transition="out" filter="fade">
+                                      <p:cBhvr>
+                                        <p:cTn id="21" dur="500"/>
+                                        <p:tgtEl>
+                                          <p:spTgt spid="7"/>
+                                        </p:tgtEl>
+                                      </p:cBhvr>
+                                    </p:animEffect>
                                     <p:set>
                                       <p:cBhvr>
-                                        <p:cTn id="21" dur="1" fill="hold">
+                                        <p:cTn id="22" dur="1" fill="hold">
                                           <p:stCondLst>
-                                            <p:cond delay="0"/>
+                                            <p:cond delay="499"/>
                                           </p:stCondLst>
                                         </p:cTn>
                                         <p:tgtEl>
-                                          <p:spTgt spid="2">
-                                            <p:txEl>
-                                              <p:pRg st="3" end="3"/>
-                                            </p:txEl>
-                                          </p:spTgt>
+                                          <p:spTgt spid="7"/>
                                         </p:tgtEl>
                                         <p:attrNameLst>
                                           <p:attrName>style.visibility</p:attrName>
                                         </p:attrNameLst>
                                       </p:cBhvr>
                                       <p:to>
-                                        <p:strVal val="visible"/>
+                                        <p:strVal val="hidden"/>
                                       </p:to>
                                     </p:set>
-                                    <p:animEffect transition="in" filter="fade">
-                                      <p:cBhvr>
-                                        <p:cTn id="22" dur="500"/>
-                                        <p:tgtEl>
-                                          <p:spTgt spid="2">
-                                            <p:txEl>
-                                              <p:pRg st="3" end="3"/>
-                                            </p:txEl>
-                                          </p:spTgt>
-                                        </p:tgtEl>
-                                      </p:cBhvr>
-                                    </p:animEffect>
                                   </p:childTnLst>
                                 </p:cTn>
                               </p:par>
@@ -14749,27 +13569,534 @@
                       </p:childTnLst>
                     </p:cTn>
                   </p:par>
+                </p:childTnLst>
+              </p:cTn>
+              <p:prevCondLst>
+                <p:cond evt="onPrev" delay="0">
+                  <p:tgtEl>
+                    <p:sldTgt/>
+                  </p:tgtEl>
+                </p:cond>
+              </p:prevCondLst>
+              <p:nextCondLst>
+                <p:cond evt="onNext" delay="0">
+                  <p:tgtEl>
+                    <p:sldTgt/>
+                  </p:tgtEl>
+                </p:cond>
+              </p:nextCondLst>
+            </p:seq>
+          </p:childTnLst>
+        </p:cTn>
+      </p:par>
+    </p:tnLst>
+    <p:bldLst>
+      <p:bldP spid="2" grpId="0" uiExpand="1" build="p"/>
+      <p:bldP spid="7" grpId="0" animBg="1"/>
+    </p:bldLst>
+  </p:timing>
+</p:sld>
+</file>
+
+<file path=ppt/slides/slide6.xml><?xml version="1.0" encoding="utf-8"?>
+<p:sld xmlns:a="http://schemas.openxmlformats.org/drawingml/2006/main" xmlns:r="http://schemas.openxmlformats.org/officeDocument/2006/relationships" xmlns:p="http://schemas.openxmlformats.org/presentationml/2006/main">
+  <p:cSld>
+    <p:spTree>
+      <p:nvGrpSpPr>
+        <p:cNvPr id="1" name=""/>
+        <p:cNvGrpSpPr/>
+        <p:nvPr/>
+      </p:nvGrpSpPr>
+      <p:grpSpPr>
+        <a:xfrm>
+          <a:off x="0" y="0"/>
+          <a:ext cx="0" cy="0"/>
+          <a:chOff x="0" y="0"/>
+          <a:chExt cx="0" cy="0"/>
+        </a:xfrm>
+      </p:grpSpPr>
+      <p:sp>
+        <p:nvSpPr>
+          <p:cNvPr id="2" name="Content Placeholder 1">
+            <a:extLst>
+              <a:ext uri="{FF2B5EF4-FFF2-40B4-BE49-F238E27FC236}">
+                <a16:creationId xmlns:a16="http://schemas.microsoft.com/office/drawing/2014/main" id="{925F3637-78E7-935A-66F3-962105DBBC1A}"/>
+              </a:ext>
+            </a:extLst>
+          </p:cNvPr>
+          <p:cNvSpPr>
+            <a:spLocks noGrp="1"/>
+          </p:cNvSpPr>
+          <p:nvPr>
+            <p:ph sz="quarter" idx="11"/>
+          </p:nvPr>
+        </p:nvSpPr>
+        <p:spPr/>
+        <p:txBody>
+          <a:bodyPr>
+            <a:normAutofit fontScale="92500" lnSpcReduction="20000"/>
+          </a:bodyPr>
+          <a:lstStyle/>
+          <a:p>
+            <a:pPr marL="400050" indent="-387350">
+              <a:buSzPct val="80000"/>
+              <a:buFont typeface="System Font Regular"/>
+              <a:buChar char="💪"/>
+            </a:pPr>
+            <a:r>
+              <a:rPr lang="en-US" dirty="0"/>
+              <a:t>Core debugging skills </a:t>
+            </a:r>
+          </a:p>
+          <a:p>
+            <a:pPr marL="800100" lvl="1" indent="-400050">
+              <a:buSzPct val="80000"/>
+              <a:buFont typeface="System Font Regular"/>
+              <a:buChar char="🛑"/>
+            </a:pPr>
+            <a:r>
+              <a:rPr lang="en-US" dirty="0"/>
+              <a:t>Manage breakpoints: Freeze time!</a:t>
+            </a:r>
+          </a:p>
+          <a:p>
+            <a:pPr marL="800100" lvl="1" indent="-400050">
+              <a:buSzPct val="80000"/>
+              <a:buFont typeface="System Font Regular"/>
+              <a:buChar char="🩻"/>
+            </a:pPr>
+            <a:r>
+              <a:rPr lang="en-US" dirty="0"/>
+              <a:t>Inspect variables: X-Ray vision!</a:t>
+            </a:r>
+          </a:p>
+          <a:p>
+            <a:pPr marL="400050" indent="-387350">
+              <a:buSzPct val="80000"/>
+              <a:buFont typeface="System Font Regular"/>
+              <a:buChar char="🎓"/>
+            </a:pPr>
+            <a:r>
+              <a:rPr lang="en-US" dirty="0"/>
+              <a:t>Advanced debugging techniques </a:t>
+            </a:r>
+          </a:p>
+          <a:p>
+            <a:pPr marL="800100" lvl="1" indent="-388938">
+              <a:buSzPct val="80000"/>
+              <a:buFont typeface="System Font Regular"/>
+              <a:buChar char="🧠"/>
+            </a:pPr>
+            <a:r>
+              <a:rPr lang="en-US" dirty="0"/>
+              <a:t>Use the debug console: Memory manipulation!</a:t>
+            </a:r>
+          </a:p>
+          <a:p>
+            <a:pPr marL="800100" lvl="1" indent="-388938">
+              <a:buSzPct val="80000"/>
+              <a:buFont typeface="System Font Regular"/>
+              <a:buChar char="⏪"/>
+            </a:pPr>
+            <a:r>
+              <a:rPr lang="en-US" dirty="0"/>
+              <a:t>Analyze the call stack: Travel back in time!</a:t>
+            </a:r>
+          </a:p>
+          <a:p>
+            <a:pPr marL="400050" indent="-387350">
+              <a:buSzPct val="80000"/>
+              <a:buFont typeface="System Font Regular"/>
+              <a:buChar char="🧑‍💻"/>
+            </a:pPr>
+            <a:r>
+              <a:rPr lang="en-US" dirty="0"/>
+              <a:t>Professional development practice</a:t>
+            </a:r>
+          </a:p>
+          <a:p>
+            <a:pPr marL="800100" lvl="1" indent="-388938">
+              <a:buFont typeface="System Font Regular"/>
+              <a:buChar char="🦸"/>
+            </a:pPr>
+            <a:r>
+              <a:rPr lang="en-US" dirty="0"/>
+              <a:t>Integrate debugging into your regular coding workflow</a:t>
+            </a:r>
+          </a:p>
+        </p:txBody>
+      </p:sp>
+      <p:sp>
+        <p:nvSpPr>
+          <p:cNvPr id="3" name="Title 2">
+            <a:extLst>
+              <a:ext uri="{FF2B5EF4-FFF2-40B4-BE49-F238E27FC236}">
+                <a16:creationId xmlns:a16="http://schemas.microsoft.com/office/drawing/2014/main" id="{8A11EF85-BA45-3A6D-7C7D-D109EB7CFE6C}"/>
+              </a:ext>
+            </a:extLst>
+          </p:cNvPr>
+          <p:cNvSpPr>
+            <a:spLocks noGrp="1"/>
+          </p:cNvSpPr>
+          <p:nvPr>
+            <p:ph type="title"/>
+          </p:nvPr>
+        </p:nvSpPr>
+        <p:spPr/>
+        <p:txBody>
+          <a:bodyPr/>
+          <a:lstStyle/>
+          <a:p>
+            <a:r>
+              <a:rPr lang="en-US" dirty="0"/>
+              <a:t>Superpowers granted by today’s workshop</a:t>
+            </a:r>
+          </a:p>
+        </p:txBody>
+      </p:sp>
+      <p:sp>
+        <p:nvSpPr>
+          <p:cNvPr id="4" name="Footer Placeholder 3">
+            <a:extLst>
+              <a:ext uri="{FF2B5EF4-FFF2-40B4-BE49-F238E27FC236}">
+                <a16:creationId xmlns:a16="http://schemas.microsoft.com/office/drawing/2014/main" id="{32BFC3AD-8007-C5E8-FE83-52FB32AB5FA7}"/>
+              </a:ext>
+            </a:extLst>
+          </p:cNvPr>
+          <p:cNvSpPr>
+            <a:spLocks noGrp="1"/>
+          </p:cNvSpPr>
+          <p:nvPr>
+            <p:ph type="ftr" sz="quarter" idx="12"/>
+          </p:nvPr>
+        </p:nvSpPr>
+        <p:spPr/>
+        <p:txBody>
+          <a:bodyPr/>
+          <a:lstStyle/>
+          <a:p>
+            <a:r>
+              <a:rPr lang="en-AU"/>
+              <a:t>Debugging Superpowers in Python</a:t>
+            </a:r>
+            <a:endParaRPr lang="en-AU" dirty="0"/>
+          </a:p>
+        </p:txBody>
+      </p:sp>
+      <p:sp>
+        <p:nvSpPr>
+          <p:cNvPr id="5" name="Slide Number Placeholder 4">
+            <a:extLst>
+              <a:ext uri="{FF2B5EF4-FFF2-40B4-BE49-F238E27FC236}">
+                <a16:creationId xmlns:a16="http://schemas.microsoft.com/office/drawing/2014/main" id="{03C0AFDC-8EA1-B618-3CED-A428EA9A038C}"/>
+              </a:ext>
+            </a:extLst>
+          </p:cNvPr>
+          <p:cNvSpPr>
+            <a:spLocks noGrp="1"/>
+          </p:cNvSpPr>
+          <p:nvPr>
+            <p:ph type="sldNum" sz="quarter" idx="13"/>
+          </p:nvPr>
+        </p:nvSpPr>
+        <p:spPr/>
+        <p:txBody>
+          <a:bodyPr/>
+          <a:lstStyle/>
+          <a:p>
+            <a:fld id="{E917DE0E-AFB1-41FD-BC35-27DB61CA125F}" type="slidenum">
+              <a:rPr lang="en-AU" smtClean="0"/>
+              <a:pPr/>
+              <a:t>6</a:t>
+            </a:fld>
+            <a:endParaRPr lang="en-AU" dirty="0"/>
+          </a:p>
+        </p:txBody>
+      </p:sp>
+    </p:spTree>
+    <p:extLst>
+      <p:ext uri="{BB962C8B-B14F-4D97-AF65-F5344CB8AC3E}">
+        <p14:creationId xmlns:p14="http://schemas.microsoft.com/office/powerpoint/2010/main" val="1558499539"/>
+      </p:ext>
+    </p:extLst>
+  </p:cSld>
+  <p:clrMapOvr>
+    <a:masterClrMapping/>
+  </p:clrMapOvr>
+  <mc:AlternateContent xmlns:mc="http://schemas.openxmlformats.org/markup-compatibility/2006" xmlns:p14="http://schemas.microsoft.com/office/powerpoint/2010/main">
+    <mc:Choice Requires="p14">
+      <p:transition spd="med" p14:dur="700">
+        <p:fade/>
+      </p:transition>
+    </mc:Choice>
+    <mc:Fallback xmlns="">
+      <p:transition spd="med">
+        <p:fade/>
+      </p:transition>
+    </mc:Fallback>
+  </mc:AlternateContent>
+  <p:timing>
+    <p:tnLst>
+      <p:par>
+        <p:cTn id="1" dur="indefinite" restart="never" nodeType="tmRoot">
+          <p:childTnLst>
+            <p:seq concurrent="1" nextAc="seek">
+              <p:cTn id="2" dur="indefinite" nodeType="mainSeq">
+                <p:childTnLst>
                   <p:par>
-                    <p:cTn id="28" fill="hold">
+                    <p:cTn id="3" fill="hold">
                       <p:stCondLst>
                         <p:cond delay="indefinite"/>
                       </p:stCondLst>
                       <p:childTnLst>
                         <p:par>
-                          <p:cTn id="29" fill="hold">
+                          <p:cTn id="4" fill="hold">
                             <p:stCondLst>
                               <p:cond delay="0"/>
                             </p:stCondLst>
                             <p:childTnLst>
                               <p:par>
-                                <p:cTn id="30" presetID="10" presetClass="entr" presetSubtype="0" fill="hold" grpId="0" nodeType="clickEffect">
+                                <p:cTn id="5" presetID="10" presetClass="entr" presetSubtype="0" fill="hold" grpId="0" nodeType="clickEffect">
                                   <p:stCondLst>
                                     <p:cond delay="0"/>
                                   </p:stCondLst>
                                   <p:childTnLst>
                                     <p:set>
                                       <p:cBhvr>
-                                        <p:cTn id="31" dur="1" fill="hold">
+                                        <p:cTn id="6" dur="1" fill="hold">
+                                          <p:stCondLst>
+                                            <p:cond delay="0"/>
+                                          </p:stCondLst>
+                                        </p:cTn>
+                                        <p:tgtEl>
+                                          <p:spTgt spid="2">
+                                            <p:txEl>
+                                              <p:pRg st="0" end="0"/>
+                                            </p:txEl>
+                                          </p:spTgt>
+                                        </p:tgtEl>
+                                        <p:attrNameLst>
+                                          <p:attrName>style.visibility</p:attrName>
+                                        </p:attrNameLst>
+                                      </p:cBhvr>
+                                      <p:to>
+                                        <p:strVal val="visible"/>
+                                      </p:to>
+                                    </p:set>
+                                    <p:animEffect transition="in" filter="fade">
+                                      <p:cBhvr>
+                                        <p:cTn id="7" dur="500"/>
+                                        <p:tgtEl>
+                                          <p:spTgt spid="2">
+                                            <p:txEl>
+                                              <p:pRg st="0" end="0"/>
+                                            </p:txEl>
+                                          </p:spTgt>
+                                        </p:tgtEl>
+                                      </p:cBhvr>
+                                    </p:animEffect>
+                                  </p:childTnLst>
+                                </p:cTn>
+                              </p:par>
+                              <p:par>
+                                <p:cTn id="8" presetID="10" presetClass="entr" presetSubtype="0" fill="hold" grpId="0" nodeType="withEffect">
+                                  <p:stCondLst>
+                                    <p:cond delay="0"/>
+                                  </p:stCondLst>
+                                  <p:childTnLst>
+                                    <p:set>
+                                      <p:cBhvr>
+                                        <p:cTn id="9" dur="1" fill="hold">
+                                          <p:stCondLst>
+                                            <p:cond delay="0"/>
+                                          </p:stCondLst>
+                                        </p:cTn>
+                                        <p:tgtEl>
+                                          <p:spTgt spid="2">
+                                            <p:txEl>
+                                              <p:pRg st="1" end="1"/>
+                                            </p:txEl>
+                                          </p:spTgt>
+                                        </p:tgtEl>
+                                        <p:attrNameLst>
+                                          <p:attrName>style.visibility</p:attrName>
+                                        </p:attrNameLst>
+                                      </p:cBhvr>
+                                      <p:to>
+                                        <p:strVal val="visible"/>
+                                      </p:to>
+                                    </p:set>
+                                    <p:animEffect transition="in" filter="fade">
+                                      <p:cBhvr>
+                                        <p:cTn id="10" dur="500"/>
+                                        <p:tgtEl>
+                                          <p:spTgt spid="2">
+                                            <p:txEl>
+                                              <p:pRg st="1" end="1"/>
+                                            </p:txEl>
+                                          </p:spTgt>
+                                        </p:tgtEl>
+                                      </p:cBhvr>
+                                    </p:animEffect>
+                                  </p:childTnLst>
+                                </p:cTn>
+                              </p:par>
+                              <p:par>
+                                <p:cTn id="11" presetID="10" presetClass="entr" presetSubtype="0" fill="hold" grpId="0" nodeType="withEffect">
+                                  <p:stCondLst>
+                                    <p:cond delay="0"/>
+                                  </p:stCondLst>
+                                  <p:childTnLst>
+                                    <p:set>
+                                      <p:cBhvr>
+                                        <p:cTn id="12" dur="1" fill="hold">
+                                          <p:stCondLst>
+                                            <p:cond delay="0"/>
+                                          </p:stCondLst>
+                                        </p:cTn>
+                                        <p:tgtEl>
+                                          <p:spTgt spid="2">
+                                            <p:txEl>
+                                              <p:pRg st="2" end="2"/>
+                                            </p:txEl>
+                                          </p:spTgt>
+                                        </p:tgtEl>
+                                        <p:attrNameLst>
+                                          <p:attrName>style.visibility</p:attrName>
+                                        </p:attrNameLst>
+                                      </p:cBhvr>
+                                      <p:to>
+                                        <p:strVal val="visible"/>
+                                      </p:to>
+                                    </p:set>
+                                    <p:animEffect transition="in" filter="fade">
+                                      <p:cBhvr>
+                                        <p:cTn id="13" dur="500"/>
+                                        <p:tgtEl>
+                                          <p:spTgt spid="2">
+                                            <p:txEl>
+                                              <p:pRg st="2" end="2"/>
+                                            </p:txEl>
+                                          </p:spTgt>
+                                        </p:tgtEl>
+                                      </p:cBhvr>
+                                    </p:animEffect>
+                                  </p:childTnLst>
+                                </p:cTn>
+                              </p:par>
+                            </p:childTnLst>
+                          </p:cTn>
+                        </p:par>
+                      </p:childTnLst>
+                    </p:cTn>
+                  </p:par>
+                  <p:par>
+                    <p:cTn id="14" fill="hold">
+                      <p:stCondLst>
+                        <p:cond delay="indefinite"/>
+                      </p:stCondLst>
+                      <p:childTnLst>
+                        <p:par>
+                          <p:cTn id="15" fill="hold">
+                            <p:stCondLst>
+                              <p:cond delay="0"/>
+                            </p:stCondLst>
+                            <p:childTnLst>
+                              <p:par>
+                                <p:cTn id="16" presetID="10" presetClass="entr" presetSubtype="0" fill="hold" grpId="0" nodeType="clickEffect">
+                                  <p:stCondLst>
+                                    <p:cond delay="0"/>
+                                  </p:stCondLst>
+                                  <p:childTnLst>
+                                    <p:set>
+                                      <p:cBhvr>
+                                        <p:cTn id="17" dur="1" fill="hold">
+                                          <p:stCondLst>
+                                            <p:cond delay="0"/>
+                                          </p:stCondLst>
+                                        </p:cTn>
+                                        <p:tgtEl>
+                                          <p:spTgt spid="2">
+                                            <p:txEl>
+                                              <p:pRg st="3" end="3"/>
+                                            </p:txEl>
+                                          </p:spTgt>
+                                        </p:tgtEl>
+                                        <p:attrNameLst>
+                                          <p:attrName>style.visibility</p:attrName>
+                                        </p:attrNameLst>
+                                      </p:cBhvr>
+                                      <p:to>
+                                        <p:strVal val="visible"/>
+                                      </p:to>
+                                    </p:set>
+                                    <p:animEffect transition="in" filter="fade">
+                                      <p:cBhvr>
+                                        <p:cTn id="18" dur="500"/>
+                                        <p:tgtEl>
+                                          <p:spTgt spid="2">
+                                            <p:txEl>
+                                              <p:pRg st="3" end="3"/>
+                                            </p:txEl>
+                                          </p:spTgt>
+                                        </p:tgtEl>
+                                      </p:cBhvr>
+                                    </p:animEffect>
+                                  </p:childTnLst>
+                                </p:cTn>
+                              </p:par>
+                              <p:par>
+                                <p:cTn id="19" presetID="10" presetClass="entr" presetSubtype="0" fill="hold" grpId="0" nodeType="withEffect">
+                                  <p:stCondLst>
+                                    <p:cond delay="0"/>
+                                  </p:stCondLst>
+                                  <p:childTnLst>
+                                    <p:set>
+                                      <p:cBhvr>
+                                        <p:cTn id="20" dur="1" fill="hold">
+                                          <p:stCondLst>
+                                            <p:cond delay="0"/>
+                                          </p:stCondLst>
+                                        </p:cTn>
+                                        <p:tgtEl>
+                                          <p:spTgt spid="2">
+                                            <p:txEl>
+                                              <p:pRg st="4" end="4"/>
+                                            </p:txEl>
+                                          </p:spTgt>
+                                        </p:tgtEl>
+                                        <p:attrNameLst>
+                                          <p:attrName>style.visibility</p:attrName>
+                                        </p:attrNameLst>
+                                      </p:cBhvr>
+                                      <p:to>
+                                        <p:strVal val="visible"/>
+                                      </p:to>
+                                    </p:set>
+                                    <p:animEffect transition="in" filter="fade">
+                                      <p:cBhvr>
+                                        <p:cTn id="21" dur="500"/>
+                                        <p:tgtEl>
+                                          <p:spTgt spid="2">
+                                            <p:txEl>
+                                              <p:pRg st="4" end="4"/>
+                                            </p:txEl>
+                                          </p:spTgt>
+                                        </p:tgtEl>
+                                      </p:cBhvr>
+                                    </p:animEffect>
+                                  </p:childTnLst>
+                                </p:cTn>
+                              </p:par>
+                              <p:par>
+                                <p:cTn id="22" presetID="10" presetClass="entr" presetSubtype="0" fill="hold" grpId="0" nodeType="withEffect">
+                                  <p:stCondLst>
+                                    <p:cond delay="0"/>
+                                  </p:stCondLst>
+                                  <p:childTnLst>
+                                    <p:set>
+                                      <p:cBhvr>
+                                        <p:cTn id="23" dur="1" fill="hold">
                                           <p:stCondLst>
                                             <p:cond delay="0"/>
                                           </p:stCondLst>
@@ -14791,7 +14118,7 @@
                                     </p:set>
                                     <p:animEffect transition="in" filter="fade">
                                       <p:cBhvr>
-                                        <p:cTn id="32" dur="500"/>
+                                        <p:cTn id="24" dur="500"/>
                                         <p:tgtEl>
                                           <p:spTgt spid="2">
                                             <p:txEl>
@@ -14811,26 +14138,26 @@
                     </p:cTn>
                   </p:par>
                   <p:par>
-                    <p:cTn id="33" fill="hold">
+                    <p:cTn id="25" fill="hold">
                       <p:stCondLst>
                         <p:cond delay="indefinite"/>
                       </p:stCondLst>
                       <p:childTnLst>
                         <p:par>
-                          <p:cTn id="34" fill="hold">
+                          <p:cTn id="26" fill="hold">
                             <p:stCondLst>
                               <p:cond delay="0"/>
                             </p:stCondLst>
                             <p:childTnLst>
                               <p:par>
-                                <p:cTn id="35" presetID="10" presetClass="entr" presetSubtype="0" fill="hold" grpId="0" nodeType="clickEffect">
+                                <p:cTn id="27" presetID="10" presetClass="entr" presetSubtype="0" fill="hold" grpId="0" nodeType="clickEffect">
                                   <p:stCondLst>
                                     <p:cond delay="0"/>
                                   </p:stCondLst>
                                   <p:childTnLst>
                                     <p:set>
                                       <p:cBhvr>
-                                        <p:cTn id="36" dur="1" fill="hold">
+                                        <p:cTn id="28" dur="1" fill="hold">
                                           <p:stCondLst>
                                             <p:cond delay="0"/>
                                           </p:stCondLst>
@@ -14852,7 +14179,710 @@
                                     </p:set>
                                     <p:animEffect transition="in" filter="fade">
                                       <p:cBhvr>
-                                        <p:cTn id="37" dur="500"/>
+                                        <p:cTn id="29" dur="500"/>
+                                        <p:tgtEl>
+                                          <p:spTgt spid="2">
+                                            <p:txEl>
+                                              <p:pRg st="6" end="6"/>
+                                            </p:txEl>
+                                          </p:spTgt>
+                                        </p:tgtEl>
+                                      </p:cBhvr>
+                                    </p:animEffect>
+                                  </p:childTnLst>
+                                </p:cTn>
+                              </p:par>
+                              <p:par>
+                                <p:cTn id="30" presetID="10" presetClass="entr" presetSubtype="0" fill="hold" grpId="0" nodeType="withEffect">
+                                  <p:stCondLst>
+                                    <p:cond delay="0"/>
+                                  </p:stCondLst>
+                                  <p:childTnLst>
+                                    <p:set>
+                                      <p:cBhvr>
+                                        <p:cTn id="31" dur="1" fill="hold">
+                                          <p:stCondLst>
+                                            <p:cond delay="0"/>
+                                          </p:stCondLst>
+                                        </p:cTn>
+                                        <p:tgtEl>
+                                          <p:spTgt spid="2">
+                                            <p:txEl>
+                                              <p:pRg st="7" end="7"/>
+                                            </p:txEl>
+                                          </p:spTgt>
+                                        </p:tgtEl>
+                                        <p:attrNameLst>
+                                          <p:attrName>style.visibility</p:attrName>
+                                        </p:attrNameLst>
+                                      </p:cBhvr>
+                                      <p:to>
+                                        <p:strVal val="visible"/>
+                                      </p:to>
+                                    </p:set>
+                                    <p:animEffect transition="in" filter="fade">
+                                      <p:cBhvr>
+                                        <p:cTn id="32" dur="500"/>
+                                        <p:tgtEl>
+                                          <p:spTgt spid="2">
+                                            <p:txEl>
+                                              <p:pRg st="7" end="7"/>
+                                            </p:txEl>
+                                          </p:spTgt>
+                                        </p:tgtEl>
+                                      </p:cBhvr>
+                                    </p:animEffect>
+                                  </p:childTnLst>
+                                </p:cTn>
+                              </p:par>
+                            </p:childTnLst>
+                          </p:cTn>
+                        </p:par>
+                      </p:childTnLst>
+                    </p:cTn>
+                  </p:par>
+                </p:childTnLst>
+              </p:cTn>
+              <p:prevCondLst>
+                <p:cond evt="onPrev" delay="0">
+                  <p:tgtEl>
+                    <p:sldTgt/>
+                  </p:tgtEl>
+                </p:cond>
+              </p:prevCondLst>
+              <p:nextCondLst>
+                <p:cond evt="onNext" delay="0">
+                  <p:tgtEl>
+                    <p:sldTgt/>
+                  </p:tgtEl>
+                </p:cond>
+              </p:nextCondLst>
+            </p:seq>
+          </p:childTnLst>
+        </p:cTn>
+      </p:par>
+    </p:tnLst>
+    <p:bldLst>
+      <p:bldP spid="2" grpId="0" build="p"/>
+    </p:bldLst>
+  </p:timing>
+</p:sld>
+</file>
+
+<file path=ppt/slides/slide7.xml><?xml version="1.0" encoding="utf-8"?>
+<p:sld xmlns:a="http://schemas.openxmlformats.org/drawingml/2006/main" xmlns:r="http://schemas.openxmlformats.org/officeDocument/2006/relationships" xmlns:p="http://schemas.openxmlformats.org/presentationml/2006/main">
+  <p:cSld>
+    <p:spTree>
+      <p:nvGrpSpPr>
+        <p:cNvPr id="1" name=""/>
+        <p:cNvGrpSpPr/>
+        <p:nvPr/>
+      </p:nvGrpSpPr>
+      <p:grpSpPr>
+        <a:xfrm>
+          <a:off x="0" y="0"/>
+          <a:ext cx="0" cy="0"/>
+          <a:chOff x="0" y="0"/>
+          <a:chExt cx="0" cy="0"/>
+        </a:xfrm>
+      </p:grpSpPr>
+      <p:sp>
+        <p:nvSpPr>
+          <p:cNvPr id="2" name="Content Placeholder 1">
+            <a:extLst>
+              <a:ext uri="{FF2B5EF4-FFF2-40B4-BE49-F238E27FC236}">
+                <a16:creationId xmlns:a16="http://schemas.microsoft.com/office/drawing/2014/main" id="{7B711598-7A76-81B7-BBB1-2B6A53A6093B}"/>
+              </a:ext>
+            </a:extLst>
+          </p:cNvPr>
+          <p:cNvSpPr>
+            <a:spLocks noGrp="1"/>
+          </p:cNvSpPr>
+          <p:nvPr>
+            <p:ph sz="quarter" idx="11"/>
+          </p:nvPr>
+        </p:nvSpPr>
+        <p:spPr/>
+        <p:txBody>
+          <a:bodyPr>
+            <a:normAutofit lnSpcReduction="10000"/>
+          </a:bodyPr>
+          <a:lstStyle/>
+          <a:p>
+            <a:pPr marL="400050" indent="-387350">
+              <a:buSzPct val="80000"/>
+              <a:buFont typeface="System Font Regular"/>
+              <a:buChar char="🪈"/>
+            </a:pPr>
+            <a:r>
+              <a:rPr lang="en-US" dirty="0"/>
+              <a:t>A program that sits between your code and the Python interpreter</a:t>
+            </a:r>
+          </a:p>
+          <a:p>
+            <a:pPr marL="400050" indent="-387350">
+              <a:buSzPct val="80000"/>
+              <a:buFont typeface="System Font Regular"/>
+              <a:buChar char="👍"/>
+            </a:pPr>
+            <a:r>
+              <a:rPr lang="en-US" dirty="0"/>
+              <a:t>One such program comes with Python: </a:t>
+            </a:r>
+            <a:r>
+              <a:rPr lang="en-US" dirty="0" err="1">
+                <a:latin typeface="Menlo" panose="020B0609030804020204" pitchFamily="49" charset="0"/>
+                <a:ea typeface="Menlo" panose="020B0609030804020204" pitchFamily="49" charset="0"/>
+                <a:cs typeface="Menlo" panose="020B0609030804020204" pitchFamily="49" charset="0"/>
+              </a:rPr>
+              <a:t>pdb</a:t>
+            </a:r>
+            <a:endParaRPr lang="en-US" dirty="0">
+              <a:latin typeface="Menlo" panose="020B0609030804020204" pitchFamily="49" charset="0"/>
+              <a:ea typeface="Menlo" panose="020B0609030804020204" pitchFamily="49" charset="0"/>
+              <a:cs typeface="Menlo" panose="020B0609030804020204" pitchFamily="49" charset="0"/>
+            </a:endParaRPr>
+          </a:p>
+          <a:p>
+            <a:pPr marL="744538" lvl="1" indent="-344488">
+              <a:buSzPct val="80000"/>
+              <a:buFont typeface="System Font Regular"/>
+              <a:buChar char="🐍"/>
+            </a:pPr>
+            <a:r>
+              <a:rPr lang="en-US" dirty="0">
+                <a:latin typeface="National 2" panose="020B0504030502020203" pitchFamily="34" charset="77"/>
+                <a:ea typeface="Menlo" panose="020B0609030804020204" pitchFamily="49" charset="0"/>
+                <a:cs typeface="Menlo" panose="020B0609030804020204" pitchFamily="49" charset="0"/>
+              </a:rPr>
+              <a:t>Lightweight and runs anywhere Python runs</a:t>
+            </a:r>
+          </a:p>
+          <a:p>
+            <a:pPr marL="744538" lvl="1" indent="-333375">
+              <a:buSzPct val="80000"/>
+              <a:buFont typeface="System Font Regular"/>
+              <a:buChar char="🤖"/>
+            </a:pPr>
+            <a:r>
+              <a:rPr lang="en-US" dirty="0">
+                <a:latin typeface="National 2" panose="020B0504030502020203" pitchFamily="34" charset="77"/>
+                <a:ea typeface="Menlo" panose="020B0609030804020204" pitchFamily="49" charset="0"/>
+                <a:cs typeface="Menlo" panose="020B0609030804020204" pitchFamily="49" charset="0"/>
+              </a:rPr>
+              <a:t>Command-line interface only and limited IDE integration</a:t>
+            </a:r>
+          </a:p>
+          <a:p>
+            <a:pPr marL="400050" indent="-387350">
+              <a:buBlip>
+                <a:blip r:embed="rId2"/>
+              </a:buBlip>
+            </a:pPr>
+            <a:r>
+              <a:rPr lang="en-US" dirty="0"/>
+              <a:t>VS Code comes with its own implementation called </a:t>
+            </a:r>
+            <a:r>
+              <a:rPr lang="en-US" dirty="0" err="1">
+                <a:latin typeface="Menlo" panose="020B0609030804020204" pitchFamily="49" charset="0"/>
+                <a:ea typeface="Menlo" panose="020B0609030804020204" pitchFamily="49" charset="0"/>
+                <a:cs typeface="Menlo" panose="020B0609030804020204" pitchFamily="49" charset="0"/>
+              </a:rPr>
+              <a:t>debugpy</a:t>
+            </a:r>
+            <a:endParaRPr lang="en-US" dirty="0">
+              <a:latin typeface="Menlo" panose="020B0609030804020204" pitchFamily="49" charset="0"/>
+              <a:ea typeface="Menlo" panose="020B0609030804020204" pitchFamily="49" charset="0"/>
+              <a:cs typeface="Menlo" panose="020B0609030804020204" pitchFamily="49" charset="0"/>
+            </a:endParaRPr>
+          </a:p>
+          <a:p>
+            <a:pPr marL="744538" lvl="1" indent="-333375">
+              <a:buSzPct val="80000"/>
+              <a:buFont typeface="System Font Regular"/>
+              <a:buChar char="✨"/>
+            </a:pPr>
+            <a:r>
+              <a:rPr lang="en-US" dirty="0">
+                <a:latin typeface="National 2" panose="020B0504030502020203" pitchFamily="34" charset="77"/>
+                <a:ea typeface="Menlo" panose="020B0609030804020204" pitchFamily="49" charset="0"/>
+                <a:cs typeface="Menlo" panose="020B0609030804020204" pitchFamily="49" charset="0"/>
+              </a:rPr>
+              <a:t>Rich visual interface and easy to use</a:t>
+            </a:r>
+          </a:p>
+          <a:p>
+            <a:pPr marL="744538" lvl="1" indent="-344488">
+              <a:buSzPct val="80000"/>
+              <a:buFont typeface="System Font Regular"/>
+              <a:buChar char="🔒"/>
+            </a:pPr>
+            <a:r>
+              <a:rPr lang="en-US" dirty="0">
+                <a:latin typeface="National 2" panose="020B0504030502020203" pitchFamily="34" charset="77"/>
+                <a:ea typeface="Menlo" panose="020B0609030804020204" pitchFamily="49" charset="0"/>
+                <a:cs typeface="Menlo" panose="020B0609030804020204" pitchFamily="49" charset="0"/>
+              </a:rPr>
+              <a:t>Requires VS Code (or compatible editor) </a:t>
+            </a:r>
+          </a:p>
+        </p:txBody>
+      </p:sp>
+      <p:sp>
+        <p:nvSpPr>
+          <p:cNvPr id="3" name="Title 2">
+            <a:extLst>
+              <a:ext uri="{FF2B5EF4-FFF2-40B4-BE49-F238E27FC236}">
+                <a16:creationId xmlns:a16="http://schemas.microsoft.com/office/drawing/2014/main" id="{7E20A32A-AE0B-11CE-3197-E2B83043F824}"/>
+              </a:ext>
+            </a:extLst>
+          </p:cNvPr>
+          <p:cNvSpPr>
+            <a:spLocks noGrp="1"/>
+          </p:cNvSpPr>
+          <p:nvPr>
+            <p:ph type="title"/>
+          </p:nvPr>
+        </p:nvSpPr>
+        <p:spPr/>
+        <p:txBody>
+          <a:bodyPr/>
+          <a:lstStyle/>
+          <a:p>
+            <a:r>
+              <a:rPr lang="en-US" dirty="0"/>
+              <a:t>The Debugger (in Python)</a:t>
+            </a:r>
+          </a:p>
+        </p:txBody>
+      </p:sp>
+      <p:sp>
+        <p:nvSpPr>
+          <p:cNvPr id="4" name="Footer Placeholder 3">
+            <a:extLst>
+              <a:ext uri="{FF2B5EF4-FFF2-40B4-BE49-F238E27FC236}">
+                <a16:creationId xmlns:a16="http://schemas.microsoft.com/office/drawing/2014/main" id="{C1FF5CD9-D816-D547-BCCE-7202CF3FCB81}"/>
+              </a:ext>
+            </a:extLst>
+          </p:cNvPr>
+          <p:cNvSpPr>
+            <a:spLocks noGrp="1"/>
+          </p:cNvSpPr>
+          <p:nvPr>
+            <p:ph type="ftr" sz="quarter" idx="12"/>
+          </p:nvPr>
+        </p:nvSpPr>
+        <p:spPr/>
+        <p:txBody>
+          <a:bodyPr/>
+          <a:lstStyle/>
+          <a:p>
+            <a:r>
+              <a:rPr lang="en-AU"/>
+              <a:t>Debugging Superpowers in Python</a:t>
+            </a:r>
+            <a:endParaRPr lang="en-AU" dirty="0"/>
+          </a:p>
+        </p:txBody>
+      </p:sp>
+      <p:sp>
+        <p:nvSpPr>
+          <p:cNvPr id="5" name="Slide Number Placeholder 4">
+            <a:extLst>
+              <a:ext uri="{FF2B5EF4-FFF2-40B4-BE49-F238E27FC236}">
+                <a16:creationId xmlns:a16="http://schemas.microsoft.com/office/drawing/2014/main" id="{7F280414-60D2-D09F-C565-72FB4EF68C1B}"/>
+              </a:ext>
+            </a:extLst>
+          </p:cNvPr>
+          <p:cNvSpPr>
+            <a:spLocks noGrp="1"/>
+          </p:cNvSpPr>
+          <p:nvPr>
+            <p:ph type="sldNum" sz="quarter" idx="13"/>
+          </p:nvPr>
+        </p:nvSpPr>
+        <p:spPr/>
+        <p:txBody>
+          <a:bodyPr/>
+          <a:lstStyle/>
+          <a:p>
+            <a:fld id="{E917DE0E-AFB1-41FD-BC35-27DB61CA125F}" type="slidenum">
+              <a:rPr lang="en-AU" smtClean="0"/>
+              <a:pPr/>
+              <a:t>7</a:t>
+            </a:fld>
+            <a:endParaRPr lang="en-AU" dirty="0"/>
+          </a:p>
+        </p:txBody>
+      </p:sp>
+    </p:spTree>
+    <p:extLst>
+      <p:ext uri="{BB962C8B-B14F-4D97-AF65-F5344CB8AC3E}">
+        <p14:creationId xmlns:p14="http://schemas.microsoft.com/office/powerpoint/2010/main" val="842322863"/>
+      </p:ext>
+    </p:extLst>
+  </p:cSld>
+  <p:clrMapOvr>
+    <a:masterClrMapping/>
+  </p:clrMapOvr>
+  <mc:AlternateContent xmlns:mc="http://schemas.openxmlformats.org/markup-compatibility/2006" xmlns:p14="http://schemas.microsoft.com/office/powerpoint/2010/main">
+    <mc:Choice Requires="p14">
+      <p:transition spd="med" p14:dur="700">
+        <p:fade/>
+      </p:transition>
+    </mc:Choice>
+    <mc:Fallback xmlns="">
+      <p:transition spd="med">
+        <p:fade/>
+      </p:transition>
+    </mc:Fallback>
+  </mc:AlternateContent>
+  <p:timing>
+    <p:tnLst>
+      <p:par>
+        <p:cTn id="1" dur="indefinite" restart="never" nodeType="tmRoot">
+          <p:childTnLst>
+            <p:seq concurrent="1" nextAc="seek">
+              <p:cTn id="2" dur="indefinite" nodeType="mainSeq">
+                <p:childTnLst>
+                  <p:par>
+                    <p:cTn id="3" fill="hold">
+                      <p:stCondLst>
+                        <p:cond delay="indefinite"/>
+                      </p:stCondLst>
+                      <p:childTnLst>
+                        <p:par>
+                          <p:cTn id="4" fill="hold">
+                            <p:stCondLst>
+                              <p:cond delay="0"/>
+                            </p:stCondLst>
+                            <p:childTnLst>
+                              <p:par>
+                                <p:cTn id="5" presetID="10" presetClass="entr" presetSubtype="0" fill="hold" grpId="0" nodeType="clickEffect">
+                                  <p:stCondLst>
+                                    <p:cond delay="0"/>
+                                  </p:stCondLst>
+                                  <p:childTnLst>
+                                    <p:set>
+                                      <p:cBhvr>
+                                        <p:cTn id="6" dur="1" fill="hold">
+                                          <p:stCondLst>
+                                            <p:cond delay="0"/>
+                                          </p:stCondLst>
+                                        </p:cTn>
+                                        <p:tgtEl>
+                                          <p:spTgt spid="2">
+                                            <p:txEl>
+                                              <p:pRg st="0" end="0"/>
+                                            </p:txEl>
+                                          </p:spTgt>
+                                        </p:tgtEl>
+                                        <p:attrNameLst>
+                                          <p:attrName>style.visibility</p:attrName>
+                                        </p:attrNameLst>
+                                      </p:cBhvr>
+                                      <p:to>
+                                        <p:strVal val="visible"/>
+                                      </p:to>
+                                    </p:set>
+                                    <p:animEffect transition="in" filter="fade">
+                                      <p:cBhvr>
+                                        <p:cTn id="7" dur="500"/>
+                                        <p:tgtEl>
+                                          <p:spTgt spid="2">
+                                            <p:txEl>
+                                              <p:pRg st="0" end="0"/>
+                                            </p:txEl>
+                                          </p:spTgt>
+                                        </p:tgtEl>
+                                      </p:cBhvr>
+                                    </p:animEffect>
+                                  </p:childTnLst>
+                                </p:cTn>
+                              </p:par>
+                            </p:childTnLst>
+                          </p:cTn>
+                        </p:par>
+                      </p:childTnLst>
+                    </p:cTn>
+                  </p:par>
+                  <p:par>
+                    <p:cTn id="8" fill="hold">
+                      <p:stCondLst>
+                        <p:cond delay="indefinite"/>
+                      </p:stCondLst>
+                      <p:childTnLst>
+                        <p:par>
+                          <p:cTn id="9" fill="hold">
+                            <p:stCondLst>
+                              <p:cond delay="0"/>
+                            </p:stCondLst>
+                            <p:childTnLst>
+                              <p:par>
+                                <p:cTn id="10" presetID="10" presetClass="entr" presetSubtype="0" fill="hold" grpId="0" nodeType="clickEffect">
+                                  <p:stCondLst>
+                                    <p:cond delay="0"/>
+                                  </p:stCondLst>
+                                  <p:childTnLst>
+                                    <p:set>
+                                      <p:cBhvr>
+                                        <p:cTn id="11" dur="1" fill="hold">
+                                          <p:stCondLst>
+                                            <p:cond delay="0"/>
+                                          </p:stCondLst>
+                                        </p:cTn>
+                                        <p:tgtEl>
+                                          <p:spTgt spid="2">
+                                            <p:txEl>
+                                              <p:pRg st="1" end="1"/>
+                                            </p:txEl>
+                                          </p:spTgt>
+                                        </p:tgtEl>
+                                        <p:attrNameLst>
+                                          <p:attrName>style.visibility</p:attrName>
+                                        </p:attrNameLst>
+                                      </p:cBhvr>
+                                      <p:to>
+                                        <p:strVal val="visible"/>
+                                      </p:to>
+                                    </p:set>
+                                    <p:animEffect transition="in" filter="fade">
+                                      <p:cBhvr>
+                                        <p:cTn id="12" dur="500"/>
+                                        <p:tgtEl>
+                                          <p:spTgt spid="2">
+                                            <p:txEl>
+                                              <p:pRg st="1" end="1"/>
+                                            </p:txEl>
+                                          </p:spTgt>
+                                        </p:tgtEl>
+                                      </p:cBhvr>
+                                    </p:animEffect>
+                                  </p:childTnLst>
+                                </p:cTn>
+                              </p:par>
+                              <p:par>
+                                <p:cTn id="13" presetID="10" presetClass="entr" presetSubtype="0" fill="hold" grpId="0" nodeType="withEffect">
+                                  <p:stCondLst>
+                                    <p:cond delay="0"/>
+                                  </p:stCondLst>
+                                  <p:childTnLst>
+                                    <p:set>
+                                      <p:cBhvr>
+                                        <p:cTn id="14" dur="1" fill="hold">
+                                          <p:stCondLst>
+                                            <p:cond delay="0"/>
+                                          </p:stCondLst>
+                                        </p:cTn>
+                                        <p:tgtEl>
+                                          <p:spTgt spid="2">
+                                            <p:txEl>
+                                              <p:pRg st="2" end="2"/>
+                                            </p:txEl>
+                                          </p:spTgt>
+                                        </p:tgtEl>
+                                        <p:attrNameLst>
+                                          <p:attrName>style.visibility</p:attrName>
+                                        </p:attrNameLst>
+                                      </p:cBhvr>
+                                      <p:to>
+                                        <p:strVal val="visible"/>
+                                      </p:to>
+                                    </p:set>
+                                    <p:animEffect transition="in" filter="fade">
+                                      <p:cBhvr>
+                                        <p:cTn id="15" dur="500"/>
+                                        <p:tgtEl>
+                                          <p:spTgt spid="2">
+                                            <p:txEl>
+                                              <p:pRg st="2" end="2"/>
+                                            </p:txEl>
+                                          </p:spTgt>
+                                        </p:tgtEl>
+                                      </p:cBhvr>
+                                    </p:animEffect>
+                                  </p:childTnLst>
+                                </p:cTn>
+                              </p:par>
+                              <p:par>
+                                <p:cTn id="16" presetID="10" presetClass="entr" presetSubtype="0" fill="hold" grpId="0" nodeType="withEffect">
+                                  <p:stCondLst>
+                                    <p:cond delay="0"/>
+                                  </p:stCondLst>
+                                  <p:childTnLst>
+                                    <p:set>
+                                      <p:cBhvr>
+                                        <p:cTn id="17" dur="1" fill="hold">
+                                          <p:stCondLst>
+                                            <p:cond delay="0"/>
+                                          </p:stCondLst>
+                                        </p:cTn>
+                                        <p:tgtEl>
+                                          <p:spTgt spid="2">
+                                            <p:txEl>
+                                              <p:pRg st="3" end="3"/>
+                                            </p:txEl>
+                                          </p:spTgt>
+                                        </p:tgtEl>
+                                        <p:attrNameLst>
+                                          <p:attrName>style.visibility</p:attrName>
+                                        </p:attrNameLst>
+                                      </p:cBhvr>
+                                      <p:to>
+                                        <p:strVal val="visible"/>
+                                      </p:to>
+                                    </p:set>
+                                    <p:animEffect transition="in" filter="fade">
+                                      <p:cBhvr>
+                                        <p:cTn id="18" dur="500"/>
+                                        <p:tgtEl>
+                                          <p:spTgt spid="2">
+                                            <p:txEl>
+                                              <p:pRg st="3" end="3"/>
+                                            </p:txEl>
+                                          </p:spTgt>
+                                        </p:tgtEl>
+                                      </p:cBhvr>
+                                    </p:animEffect>
+                                  </p:childTnLst>
+                                </p:cTn>
+                              </p:par>
+                            </p:childTnLst>
+                          </p:cTn>
+                        </p:par>
+                      </p:childTnLst>
+                    </p:cTn>
+                  </p:par>
+                  <p:par>
+                    <p:cTn id="19" fill="hold">
+                      <p:stCondLst>
+                        <p:cond delay="indefinite"/>
+                      </p:stCondLst>
+                      <p:childTnLst>
+                        <p:par>
+                          <p:cTn id="20" fill="hold">
+                            <p:stCondLst>
+                              <p:cond delay="0"/>
+                            </p:stCondLst>
+                            <p:childTnLst>
+                              <p:par>
+                                <p:cTn id="21" presetID="10" presetClass="entr" presetSubtype="0" fill="hold" grpId="0" nodeType="clickEffect">
+                                  <p:stCondLst>
+                                    <p:cond delay="0"/>
+                                  </p:stCondLst>
+                                  <p:childTnLst>
+                                    <p:set>
+                                      <p:cBhvr>
+                                        <p:cTn id="22" dur="1" fill="hold">
+                                          <p:stCondLst>
+                                            <p:cond delay="0"/>
+                                          </p:stCondLst>
+                                        </p:cTn>
+                                        <p:tgtEl>
+                                          <p:spTgt spid="2">
+                                            <p:txEl>
+                                              <p:pRg st="4" end="4"/>
+                                            </p:txEl>
+                                          </p:spTgt>
+                                        </p:tgtEl>
+                                        <p:attrNameLst>
+                                          <p:attrName>style.visibility</p:attrName>
+                                        </p:attrNameLst>
+                                      </p:cBhvr>
+                                      <p:to>
+                                        <p:strVal val="visible"/>
+                                      </p:to>
+                                    </p:set>
+                                    <p:animEffect transition="in" filter="fade">
+                                      <p:cBhvr>
+                                        <p:cTn id="23" dur="500"/>
+                                        <p:tgtEl>
+                                          <p:spTgt spid="2">
+                                            <p:txEl>
+                                              <p:pRg st="4" end="4"/>
+                                            </p:txEl>
+                                          </p:spTgt>
+                                        </p:tgtEl>
+                                      </p:cBhvr>
+                                    </p:animEffect>
+                                  </p:childTnLst>
+                                </p:cTn>
+                              </p:par>
+                              <p:par>
+                                <p:cTn id="24" presetID="10" presetClass="entr" presetSubtype="0" fill="hold" grpId="0" nodeType="withEffect">
+                                  <p:stCondLst>
+                                    <p:cond delay="0"/>
+                                  </p:stCondLst>
+                                  <p:childTnLst>
+                                    <p:set>
+                                      <p:cBhvr>
+                                        <p:cTn id="25" dur="1" fill="hold">
+                                          <p:stCondLst>
+                                            <p:cond delay="0"/>
+                                          </p:stCondLst>
+                                        </p:cTn>
+                                        <p:tgtEl>
+                                          <p:spTgt spid="2">
+                                            <p:txEl>
+                                              <p:pRg st="5" end="5"/>
+                                            </p:txEl>
+                                          </p:spTgt>
+                                        </p:tgtEl>
+                                        <p:attrNameLst>
+                                          <p:attrName>style.visibility</p:attrName>
+                                        </p:attrNameLst>
+                                      </p:cBhvr>
+                                      <p:to>
+                                        <p:strVal val="visible"/>
+                                      </p:to>
+                                    </p:set>
+                                    <p:animEffect transition="in" filter="fade">
+                                      <p:cBhvr>
+                                        <p:cTn id="26" dur="500"/>
+                                        <p:tgtEl>
+                                          <p:spTgt spid="2">
+                                            <p:txEl>
+                                              <p:pRg st="5" end="5"/>
+                                            </p:txEl>
+                                          </p:spTgt>
+                                        </p:tgtEl>
+                                      </p:cBhvr>
+                                    </p:animEffect>
+                                  </p:childTnLst>
+                                </p:cTn>
+                              </p:par>
+                              <p:par>
+                                <p:cTn id="27" presetID="10" presetClass="entr" presetSubtype="0" fill="hold" grpId="0" nodeType="withEffect">
+                                  <p:stCondLst>
+                                    <p:cond delay="0"/>
+                                  </p:stCondLst>
+                                  <p:childTnLst>
+                                    <p:set>
+                                      <p:cBhvr>
+                                        <p:cTn id="28" dur="1" fill="hold">
+                                          <p:stCondLst>
+                                            <p:cond delay="0"/>
+                                          </p:stCondLst>
+                                        </p:cTn>
+                                        <p:tgtEl>
+                                          <p:spTgt spid="2">
+                                            <p:txEl>
+                                              <p:pRg st="6" end="6"/>
+                                            </p:txEl>
+                                          </p:spTgt>
+                                        </p:tgtEl>
+                                        <p:attrNameLst>
+                                          <p:attrName>style.visibility</p:attrName>
+                                        </p:attrNameLst>
+                                      </p:cBhvr>
+                                      <p:to>
+                                        <p:strVal val="visible"/>
+                                      </p:to>
+                                    </p:set>
+                                    <p:animEffect transition="in" filter="fade">
+                                      <p:cBhvr>
+                                        <p:cTn id="29" dur="500"/>
                                         <p:tgtEl>
                                           <p:spTgt spid="2">
                                             <p:txEl>
@@ -14893,13 +14923,13 @@
       </p:par>
     </p:tnLst>
     <p:bldLst>
-      <p:bldP spid="2" grpId="0" uiExpand="1" build="p"/>
+      <p:bldP spid="2" grpId="0" build="p"/>
     </p:bldLst>
   </p:timing>
 </p:sld>
 </file>
 
-<file path=ppt/slides/slide9.xml><?xml version="1.0" encoding="utf-8"?>
+<file path=ppt/slides/slide8.xml><?xml version="1.0" encoding="utf-8"?>
 <p:sld xmlns:a="http://schemas.openxmlformats.org/drawingml/2006/main" xmlns:r="http://schemas.openxmlformats.org/officeDocument/2006/relationships" xmlns:p="http://schemas.openxmlformats.org/presentationml/2006/main">
   <p:cSld>
     <p:spTree>
@@ -14921,7 +14951,7 @@
           <p:cNvPr id="2" name="Content Placeholder 1">
             <a:extLst>
               <a:ext uri="{FF2B5EF4-FFF2-40B4-BE49-F238E27FC236}">
-                <a16:creationId xmlns:a16="http://schemas.microsoft.com/office/drawing/2014/main" id="{39EC843F-37B7-771A-7EEB-E373D6600836}"/>
+                <a16:creationId xmlns:a16="http://schemas.microsoft.com/office/drawing/2014/main" id="{2C00195B-4F2D-750A-25C4-3C4514399079}"/>
               </a:ext>
             </a:extLst>
           </p:cNvPr>
@@ -14937,53 +14967,36 @@
           <a:bodyPr/>
           <a:lstStyle/>
           <a:p>
-            <a:pPr marL="463550" indent="-452438">
-              <a:buBlip>
-                <a:blip r:embed="rId2"/>
-              </a:buBlip>
-            </a:pPr>
-            <a:r>
-              <a:rPr lang="en-US" dirty="0" err="1">
-                <a:hlinkClick r:id="rId3"/>
-              </a:rPr>
-              <a:t>PyTest</a:t>
-            </a:r>
-            <a:r>
-              <a:rPr lang="en-US" dirty="0"/>
-              <a:t> is an open-source testing framework for Python</a:t>
-            </a:r>
-          </a:p>
-          <a:p>
-            <a:pPr marL="463550" indent="-463550">
+            <a:pPr marL="400050" indent="-446088">
               <a:buSzPct val="80000"/>
               <a:buFont typeface="System Font Regular"/>
-              <a:buChar char="🤩"/>
+              <a:buChar char="🔌"/>
             </a:pPr>
             <a:r>
               <a:rPr lang="en-US" dirty="0"/>
-              <a:t>Easy and unintrusive to write simple tests</a:t>
-            </a:r>
-          </a:p>
-          <a:p>
-            <a:pPr marL="463550" indent="-452438">
+              <a:t>Debugger “attaches” to the Python process running your script</a:t>
+            </a:r>
+          </a:p>
+          <a:p>
+            <a:pPr marL="400050" indent="-446088">
               <a:buSzPct val="80000"/>
               <a:buFont typeface="System Font Regular"/>
-              <a:buChar char="🚀"/>
+              <a:buChar char="🛠️"/>
             </a:pPr>
             <a:r>
               <a:rPr lang="en-US" dirty="0"/>
-              <a:t>Elegantly scales to more complex testing scenarios</a:t>
-            </a:r>
-          </a:p>
-          <a:p>
-            <a:pPr marL="463550" indent="-509588">
+              <a:t>Can pause execution, inspect and manipulate variables, …</a:t>
+            </a:r>
+          </a:p>
+          <a:p>
+            <a:pPr marL="400050" indent="-446088">
               <a:buSzPct val="80000"/>
               <a:buFont typeface="System Font Regular"/>
-              <a:buChar char="❤️"/>
+              <a:buChar char="🎮"/>
             </a:pPr>
             <a:r>
               <a:rPr lang="en-US" dirty="0"/>
-              <a:t>A community standard</a:t>
+              <a:t>A remote control for running your code!</a:t>
             </a:r>
           </a:p>
         </p:txBody>
@@ -14993,7 +15006,7 @@
           <p:cNvPr id="3" name="Title 2">
             <a:extLst>
               <a:ext uri="{FF2B5EF4-FFF2-40B4-BE49-F238E27FC236}">
-                <a16:creationId xmlns:a16="http://schemas.microsoft.com/office/drawing/2014/main" id="{F96341FF-7F8A-2247-0090-2FCD24AFCD6A}"/>
+                <a16:creationId xmlns:a16="http://schemas.microsoft.com/office/drawing/2014/main" id="{3A8C761C-0D57-5443-89A4-AFA1C0F03038}"/>
               </a:ext>
             </a:extLst>
           </p:cNvPr>
@@ -15011,15 +15024,7 @@
           <a:p>
             <a:r>
               <a:rPr lang="en-US" dirty="0"/>
-              <a:t>Why </a:t>
-            </a:r>
-            <a:r>
-              <a:rPr lang="en-US" dirty="0" err="1"/>
-              <a:t>PyTest</a:t>
-            </a:r>
-            <a:r>
-              <a:rPr lang="en-US" dirty="0"/>
-              <a:t>?</a:t>
+              <a:t>The Debugger (in Python)</a:t>
             </a:r>
           </a:p>
         </p:txBody>
@@ -15029,7 +15034,7 @@
           <p:cNvPr id="4" name="Footer Placeholder 3">
             <a:extLst>
               <a:ext uri="{FF2B5EF4-FFF2-40B4-BE49-F238E27FC236}">
-                <a16:creationId xmlns:a16="http://schemas.microsoft.com/office/drawing/2014/main" id="{FF5FBEEE-0B4A-0925-CD55-F053A2C735E0}"/>
+                <a16:creationId xmlns:a16="http://schemas.microsoft.com/office/drawing/2014/main" id="{9F0CD2BB-98DD-A934-8FFF-C382EDD93BB8}"/>
               </a:ext>
             </a:extLst>
           </p:cNvPr>
@@ -15058,7 +15063,7 @@
           <p:cNvPr id="5" name="Slide Number Placeholder 4">
             <a:extLst>
               <a:ext uri="{FF2B5EF4-FFF2-40B4-BE49-F238E27FC236}">
-                <a16:creationId xmlns:a16="http://schemas.microsoft.com/office/drawing/2014/main" id="{B17AF390-2718-664E-F8E2-EBF24F0EAE64}"/>
+                <a16:creationId xmlns:a16="http://schemas.microsoft.com/office/drawing/2014/main" id="{B55A0787-A806-F50F-B116-455E4BA637B9}"/>
               </a:ext>
             </a:extLst>
           </p:cNvPr>
@@ -15077,46 +15082,16 @@
             <a:fld id="{E917DE0E-AFB1-41FD-BC35-27DB61CA125F}" type="slidenum">
               <a:rPr lang="en-AU" smtClean="0"/>
               <a:pPr/>
-              <a:t>9</a:t>
+              <a:t>8</a:t>
             </a:fld>
             <a:endParaRPr lang="en-AU" dirty="0"/>
           </a:p>
         </p:txBody>
       </p:sp>
-      <p:pic>
-        <p:nvPicPr>
-          <p:cNvPr id="7" name="Picture 6" descr="A logo with colorful bars&#10;&#10;AI-generated content may be incorrect.">
-            <a:extLst>
-              <a:ext uri="{FF2B5EF4-FFF2-40B4-BE49-F238E27FC236}">
-                <a16:creationId xmlns:a16="http://schemas.microsoft.com/office/drawing/2014/main" id="{3B2E90A2-0F6E-0EE2-FC9E-D1E6CE47BAD3}"/>
-              </a:ext>
-            </a:extLst>
-          </p:cNvPr>
-          <p:cNvPicPr>
-            <a:picLocks noChangeAspect="1"/>
-          </p:cNvPicPr>
-          <p:nvPr/>
-        </p:nvPicPr>
-        <p:blipFill>
-          <a:blip r:embed="rId4"/>
-          <a:stretch>
-            <a:fillRect/>
-          </a:stretch>
-        </p:blipFill>
-        <p:spPr>
-          <a:xfrm>
-            <a:off x="8991600" y="1457489"/>
-            <a:ext cx="2971800" cy="2971800"/>
-          </a:xfrm>
-          <a:prstGeom prst="rect">
-            <a:avLst/>
-          </a:prstGeom>
-        </p:spPr>
-      </p:pic>
     </p:spTree>
     <p:extLst>
       <p:ext uri="{BB962C8B-B14F-4D97-AF65-F5344CB8AC3E}">
-        <p14:creationId xmlns:p14="http://schemas.microsoft.com/office/powerpoint/2010/main" val="3257912726"/>
+        <p14:creationId xmlns:p14="http://schemas.microsoft.com/office/powerpoint/2010/main" val="1820793836"/>
       </p:ext>
     </p:extLst>
   </p:cSld>
@@ -15326,67 +15301,6 @@
                       </p:childTnLst>
                     </p:cTn>
                   </p:par>
-                  <p:par>
-                    <p:cTn id="18" fill="hold">
-                      <p:stCondLst>
-                        <p:cond delay="indefinite"/>
-                      </p:stCondLst>
-                      <p:childTnLst>
-                        <p:par>
-                          <p:cTn id="19" fill="hold">
-                            <p:stCondLst>
-                              <p:cond delay="0"/>
-                            </p:stCondLst>
-                            <p:childTnLst>
-                              <p:par>
-                                <p:cTn id="20" presetID="10" presetClass="entr" presetSubtype="0" fill="hold" grpId="0" nodeType="clickEffect">
-                                  <p:stCondLst>
-                                    <p:cond delay="0"/>
-                                  </p:stCondLst>
-                                  <p:childTnLst>
-                                    <p:set>
-                                      <p:cBhvr>
-                                        <p:cTn id="21" dur="1" fill="hold">
-                                          <p:stCondLst>
-                                            <p:cond delay="0"/>
-                                          </p:stCondLst>
-                                        </p:cTn>
-                                        <p:tgtEl>
-                                          <p:spTgt spid="2">
-                                            <p:txEl>
-                                              <p:pRg st="3" end="3"/>
-                                            </p:txEl>
-                                          </p:spTgt>
-                                        </p:tgtEl>
-                                        <p:attrNameLst>
-                                          <p:attrName>style.visibility</p:attrName>
-                                        </p:attrNameLst>
-                                      </p:cBhvr>
-                                      <p:to>
-                                        <p:strVal val="visible"/>
-                                      </p:to>
-                                    </p:set>
-                                    <p:animEffect transition="in" filter="fade">
-                                      <p:cBhvr>
-                                        <p:cTn id="22" dur="500"/>
-                                        <p:tgtEl>
-                                          <p:spTgt spid="2">
-                                            <p:txEl>
-                                              <p:pRg st="3" end="3"/>
-                                            </p:txEl>
-                                          </p:spTgt>
-                                        </p:tgtEl>
-                                      </p:cBhvr>
-                                    </p:animEffect>
-                                  </p:childTnLst>
-                                </p:cTn>
-                              </p:par>
-                            </p:childTnLst>
-                          </p:cTn>
-                        </p:par>
-                      </p:childTnLst>
-                    </p:cTn>
-                  </p:par>
                 </p:childTnLst>
               </p:cTn>
               <p:prevCondLst>
@@ -15412,6 +15326,164 @@
       <p:bldP spid="2" grpId="0" build="p"/>
     </p:bldLst>
   </p:timing>
+</p:sld>
+</file>
+
+<file path=ppt/slides/slide9.xml><?xml version="1.0" encoding="utf-8"?>
+<p:sld xmlns:a="http://schemas.openxmlformats.org/drawingml/2006/main" xmlns:r="http://schemas.openxmlformats.org/officeDocument/2006/relationships" xmlns:p="http://schemas.openxmlformats.org/presentationml/2006/main">
+  <p:cSld>
+    <p:spTree>
+      <p:nvGrpSpPr>
+        <p:cNvPr id="1" name=""/>
+        <p:cNvGrpSpPr/>
+        <p:nvPr/>
+      </p:nvGrpSpPr>
+      <p:grpSpPr>
+        <a:xfrm>
+          <a:off x="0" y="0"/>
+          <a:ext cx="0" cy="0"/>
+          <a:chOff x="0" y="0"/>
+          <a:chExt cx="0" cy="0"/>
+        </a:xfrm>
+      </p:grpSpPr>
+      <p:sp>
+        <p:nvSpPr>
+          <p:cNvPr id="6" name="Title 5">
+            <a:extLst>
+              <a:ext uri="{FF2B5EF4-FFF2-40B4-BE49-F238E27FC236}">
+                <a16:creationId xmlns:a16="http://schemas.microsoft.com/office/drawing/2014/main" id="{799A42EC-49B8-97EB-A246-0D49734CC4E0}"/>
+              </a:ext>
+            </a:extLst>
+          </p:cNvPr>
+          <p:cNvSpPr>
+            <a:spLocks noGrp="1"/>
+          </p:cNvSpPr>
+          <p:nvPr>
+            <p:ph type="title"/>
+          </p:nvPr>
+        </p:nvSpPr>
+        <p:spPr/>
+        <p:txBody>
+          <a:bodyPr/>
+          <a:lstStyle/>
+          <a:p>
+            <a:r>
+              <a:rPr lang="en-US" dirty="0"/>
+              <a:t>Let’s get started!</a:t>
+            </a:r>
+          </a:p>
+        </p:txBody>
+      </p:sp>
+      <p:sp>
+        <p:nvSpPr>
+          <p:cNvPr id="7" name="Text Placeholder 6">
+            <a:extLst>
+              <a:ext uri="{FF2B5EF4-FFF2-40B4-BE49-F238E27FC236}">
+                <a16:creationId xmlns:a16="http://schemas.microsoft.com/office/drawing/2014/main" id="{BA3285D9-E615-694B-CE77-B327E021E682}"/>
+              </a:ext>
+            </a:extLst>
+          </p:cNvPr>
+          <p:cNvSpPr>
+            <a:spLocks noGrp="1"/>
+          </p:cNvSpPr>
+          <p:nvPr>
+            <p:ph type="body" sz="quarter" idx="10"/>
+          </p:nvPr>
+        </p:nvSpPr>
+        <p:spPr/>
+        <p:txBody>
+          <a:bodyPr/>
+          <a:lstStyle/>
+          <a:p>
+            <a:r>
+              <a:rPr lang="en-US" dirty="0"/>
+              <a:t>Hands-on</a:t>
+            </a:r>
+          </a:p>
+        </p:txBody>
+      </p:sp>
+      <p:sp>
+        <p:nvSpPr>
+          <p:cNvPr id="4" name="Footer Placeholder 3">
+            <a:extLst>
+              <a:ext uri="{FF2B5EF4-FFF2-40B4-BE49-F238E27FC236}">
+                <a16:creationId xmlns:a16="http://schemas.microsoft.com/office/drawing/2014/main" id="{EA5BCBE5-A728-9E1E-1AA0-95A175A194CA}"/>
+              </a:ext>
+            </a:extLst>
+          </p:cNvPr>
+          <p:cNvSpPr>
+            <a:spLocks noGrp="1"/>
+          </p:cNvSpPr>
+          <p:nvPr>
+            <p:ph type="ftr" sz="quarter" idx="11"/>
+          </p:nvPr>
+        </p:nvSpPr>
+        <p:spPr/>
+        <p:txBody>
+          <a:bodyPr/>
+          <a:lstStyle/>
+          <a:p>
+            <a:pPr algn="ctr"/>
+            <a:r>
+              <a:rPr lang="en-AU"/>
+              <a:t>Debugging Superpowers in Python</a:t>
+            </a:r>
+            <a:endParaRPr lang="en-AU" dirty="0"/>
+          </a:p>
+        </p:txBody>
+      </p:sp>
+      <p:sp>
+        <p:nvSpPr>
+          <p:cNvPr id="5" name="Slide Number Placeholder 4">
+            <a:extLst>
+              <a:ext uri="{FF2B5EF4-FFF2-40B4-BE49-F238E27FC236}">
+                <a16:creationId xmlns:a16="http://schemas.microsoft.com/office/drawing/2014/main" id="{1E925C1A-D32C-166C-A2C7-CBEB339D5AE0}"/>
+              </a:ext>
+            </a:extLst>
+          </p:cNvPr>
+          <p:cNvSpPr>
+            <a:spLocks noGrp="1"/>
+          </p:cNvSpPr>
+          <p:nvPr>
+            <p:ph type="sldNum" sz="quarter" idx="12"/>
+          </p:nvPr>
+        </p:nvSpPr>
+        <p:spPr/>
+        <p:txBody>
+          <a:bodyPr/>
+          <a:lstStyle/>
+          <a:p>
+            <a:fld id="{E917DE0E-AFB1-41FD-BC35-27DB61CA125F}" type="slidenum">
+              <a:rPr lang="en-AU" smtClean="0"/>
+              <a:pPr/>
+              <a:t>9</a:t>
+            </a:fld>
+            <a:endParaRPr lang="en-AU" dirty="0"/>
+          </a:p>
+        </p:txBody>
+      </p:sp>
+    </p:spTree>
+    <p:extLst>
+      <p:ext uri="{BB962C8B-B14F-4D97-AF65-F5344CB8AC3E}">
+        <p14:creationId xmlns:p14="http://schemas.microsoft.com/office/powerpoint/2010/main" val="1617233645"/>
+      </p:ext>
+    </p:extLst>
+  </p:cSld>
+  <p:clrMapOvr>
+    <a:masterClrMapping/>
+  </p:clrMapOvr>
+  <mc:AlternateContent xmlns:mc="http://schemas.openxmlformats.org/markup-compatibility/2006" xmlns:p14="http://schemas.microsoft.com/office/powerpoint/2010/main">
+    <mc:Choice Requires="p14">
+      <p:transition spd="med" p14:dur="700">
+        <p:fade/>
+      </p:transition>
+    </mc:Choice>
+    <mc:Fallback xmlns="">
+      <p:transition spd="med">
+        <p:fade/>
+      </p:transition>
+    </mc:Fallback>
+  </mc:AlternateContent>
 </p:sld>
 </file>
 

</xml_diff>

<commit_message>
incorporate feedback from dry-run
</commit_message>
<xml_diff>
--- a/ppt/debugging-in-python.pptx
+++ b/ppt/debugging-in-python.pptx
@@ -236,7 +236,7 @@
           <a:p>
             <a:fld id="{412A36AD-C140-47B5-A0AA-2808AF1C1C9D}" type="datetimeFigureOut">
               <a:rPr lang="en-AU" smtClean="0"/>
-              <a:t>22/9/2025</a:t>
+              <a:t>26/9/2025</a:t>
             </a:fld>
             <a:endParaRPr lang="en-AU"/>
           </a:p>
@@ -401,7 +401,7 @@
           <a:p>
             <a:fld id="{2763829E-EB69-4A98-9D54-8D6822520B27}" type="datetimeFigureOut">
               <a:rPr lang="en-AU" smtClean="0"/>
-              <a:t>22/9/2025</a:t>
+              <a:t>26/9/2025</a:t>
             </a:fld>
             <a:endParaRPr lang="en-AU"/>
           </a:p>
@@ -11189,9 +11189,16 @@
             <p:ph sz="quarter" idx="11"/>
           </p:nvPr>
         </p:nvSpPr>
-        <p:spPr/>
-        <p:txBody>
-          <a:bodyPr/>
+        <p:spPr>
+          <a:xfrm>
+            <a:off x="321508" y="2365638"/>
+            <a:ext cx="11870492" cy="4127303"/>
+          </a:xfrm>
+        </p:spPr>
+        <p:txBody>
+          <a:bodyPr>
+            <a:normAutofit/>
+          </a:bodyPr>
           <a:lstStyle/>
           <a:p>
             <a:pPr marL="9525" indent="0">
@@ -11223,22 +11230,39 @@
             </a:r>
           </a:p>
           <a:p>
-            <a:pPr marL="858838" lvl="1" indent="-392113">
+            <a:pPr marL="466725" indent="-457200">
               <a:buSzPct val="80000"/>
               <a:buFont typeface="System Font Regular"/>
-              <a:buChar char="✅"/>
+              <a:buChar char="🤔"/>
             </a:pPr>
             <a:r>
               <a:rPr lang="en-US" dirty="0"/>
-              <a:t>Note: You may want to set </a:t>
-            </a:r>
-            <a:r>
-              <a:rPr lang="en-US" dirty="0">
-                <a:hlinkClick r:id="rId2"/>
-              </a:rPr>
-              <a:t>“justmycode” to false in your launch.json</a:t>
-            </a:r>
-            <a:endParaRPr lang="en-US" dirty="0"/>
+              <a:t>Learn to debug when using frameworks (</a:t>
+            </a:r>
+            <a:r>
+              <a:rPr lang="en-US" dirty="0" err="1"/>
+              <a:t>Streamlit</a:t>
+            </a:r>
+            <a:r>
+              <a:rPr lang="en-US" dirty="0"/>
+              <a:t>, </a:t>
+            </a:r>
+            <a:r>
+              <a:rPr lang="en-US" dirty="0" err="1"/>
+              <a:t>Chainlit</a:t>
+            </a:r>
+            <a:r>
+              <a:rPr lang="en-US" dirty="0"/>
+              <a:t>, </a:t>
+            </a:r>
+            <a:r>
+              <a:rPr lang="en-US" dirty="0" err="1"/>
+              <a:t>FastAPI</a:t>
+            </a:r>
+            <a:r>
+              <a:rPr lang="en-US" dirty="0"/>
+              <a:t>, …)</a:t>
+            </a:r>
           </a:p>
           <a:p>
             <a:pPr marL="466725" indent="-457200">
@@ -11504,15 +11528,33 @@
                                   </p:childTnLst>
                                 </p:cTn>
                               </p:par>
+                            </p:childTnLst>
+                          </p:cTn>
+                        </p:par>
+                      </p:childTnLst>
+                    </p:cTn>
+                  </p:par>
+                  <p:par>
+                    <p:cTn id="13" fill="hold">
+                      <p:stCondLst>
+                        <p:cond delay="indefinite"/>
+                      </p:stCondLst>
+                      <p:childTnLst>
+                        <p:par>
+                          <p:cTn id="14" fill="hold">
+                            <p:stCondLst>
+                              <p:cond delay="0"/>
+                            </p:stCondLst>
+                            <p:childTnLst>
                               <p:par>
-                                <p:cTn id="13" presetID="10" presetClass="entr" presetSubtype="0" fill="hold" grpId="0" nodeType="withEffect">
+                                <p:cTn id="15" presetID="10" presetClass="entr" presetSubtype="0" fill="hold" grpId="0" nodeType="clickEffect">
                                   <p:stCondLst>
                                     <p:cond delay="0"/>
                                   </p:stCondLst>
                                   <p:childTnLst>
                                     <p:set>
                                       <p:cBhvr>
-                                        <p:cTn id="14" dur="1" fill="hold">
+                                        <p:cTn id="16" dur="1" fill="hold">
                                           <p:stCondLst>
                                             <p:cond delay="0"/>
                                           </p:stCondLst>
@@ -11534,7 +11576,7 @@
                                     </p:set>
                                     <p:animEffect transition="in" filter="fade">
                                       <p:cBhvr>
-                                        <p:cTn id="15" dur="500"/>
+                                        <p:cTn id="17" dur="500"/>
                                         <p:tgtEl>
                                           <p:spTgt spid="2">
                                             <p:txEl>
@@ -11554,26 +11596,26 @@
                     </p:cTn>
                   </p:par>
                   <p:par>
-                    <p:cTn id="16" fill="hold">
+                    <p:cTn id="18" fill="hold">
                       <p:stCondLst>
                         <p:cond delay="indefinite"/>
                       </p:stCondLst>
                       <p:childTnLst>
                         <p:par>
-                          <p:cTn id="17" fill="hold">
+                          <p:cTn id="19" fill="hold">
                             <p:stCondLst>
                               <p:cond delay="0"/>
                             </p:stCondLst>
                             <p:childTnLst>
                               <p:par>
-                                <p:cTn id="18" presetID="10" presetClass="entr" presetSubtype="0" fill="hold" grpId="0" nodeType="clickEffect">
+                                <p:cTn id="20" presetID="10" presetClass="entr" presetSubtype="0" fill="hold" grpId="0" nodeType="clickEffect">
                                   <p:stCondLst>
                                     <p:cond delay="0"/>
                                   </p:stCondLst>
                                   <p:childTnLst>
                                     <p:set>
                                       <p:cBhvr>
-                                        <p:cTn id="19" dur="1" fill="hold">
+                                        <p:cTn id="21" dur="1" fill="hold">
                                           <p:stCondLst>
                                             <p:cond delay="0"/>
                                           </p:stCondLst>
@@ -11595,7 +11637,7 @@
                                     </p:set>
                                     <p:animEffect transition="in" filter="fade">
                                       <p:cBhvr>
-                                        <p:cTn id="20" dur="500"/>
+                                        <p:cTn id="22" dur="500"/>
                                         <p:tgtEl>
                                           <p:spTgt spid="2">
                                             <p:txEl>
@@ -11615,26 +11657,26 @@
                     </p:cTn>
                   </p:par>
                   <p:par>
-                    <p:cTn id="21" fill="hold">
+                    <p:cTn id="23" fill="hold">
                       <p:stCondLst>
                         <p:cond delay="indefinite"/>
                       </p:stCondLst>
                       <p:childTnLst>
                         <p:par>
-                          <p:cTn id="22" fill="hold">
+                          <p:cTn id="24" fill="hold">
                             <p:stCondLst>
                               <p:cond delay="0"/>
                             </p:stCondLst>
                             <p:childTnLst>
                               <p:par>
-                                <p:cTn id="23" presetID="10" presetClass="entr" presetSubtype="0" fill="hold" grpId="0" nodeType="clickEffect">
+                                <p:cTn id="25" presetID="10" presetClass="entr" presetSubtype="0" fill="hold" grpId="0" nodeType="clickEffect">
                                   <p:stCondLst>
                                     <p:cond delay="0"/>
                                   </p:stCondLst>
                                   <p:childTnLst>
                                     <p:set>
                                       <p:cBhvr>
-                                        <p:cTn id="24" dur="1" fill="hold">
+                                        <p:cTn id="26" dur="1" fill="hold">
                                           <p:stCondLst>
                                             <p:cond delay="0"/>
                                           </p:stCondLst>
@@ -11656,7 +11698,7 @@
                                     </p:set>
                                     <p:animEffect transition="in" filter="fade">
                                       <p:cBhvr>
-                                        <p:cTn id="25" dur="500"/>
+                                        <p:cTn id="27" dur="500"/>
                                         <p:tgtEl>
                                           <p:spTgt spid="2">
                                             <p:txEl>

</xml_diff>